<commit_message>
Made [DestinationSchema] an optional parameter (ADX) and updated documentation.
</commit_message>
<xml_diff>
--- a/docs/ADF_SynapsePipelines/PPT/SlicedDataMigrationToolbox.pptx
+++ b/docs/ADF_SynapsePipelines/PPT/SlicedDataMigrationToolbox.pptx
@@ -4650,56 +4650,6 @@
       </p:grpSpPr>
       <p:sp>
         <p:nvSpPr>
-          <p:cNvPr id="2" name="Title 1">
-            <a:extLst>
-              <a:ext uri="{FF2B5EF4-FFF2-40B4-BE49-F238E27FC236}">
-                <a16:creationId xmlns:a16="http://schemas.microsoft.com/office/drawing/2014/main" id="{EC1BD4AD-AF29-42EC-0027-0B1036FEEB94}"/>
-              </a:ext>
-            </a:extLst>
-          </p:cNvPr>
-          <p:cNvSpPr>
-            <a:spLocks noGrp="1"/>
-          </p:cNvSpPr>
-          <p:nvPr>
-            <p:ph type="title"/>
-          </p:nvPr>
-        </p:nvSpPr>
-        <p:spPr/>
-        <p:txBody>
-          <a:bodyPr/>
-          <a:lstStyle/>
-          <a:p>
-            <a:endParaRPr lang="en-CH"/>
-          </a:p>
-        </p:txBody>
-      </p:sp>
-      <p:sp>
-        <p:nvSpPr>
-          <p:cNvPr id="3" name="Content Placeholder 2">
-            <a:extLst>
-              <a:ext uri="{FF2B5EF4-FFF2-40B4-BE49-F238E27FC236}">
-                <a16:creationId xmlns:a16="http://schemas.microsoft.com/office/drawing/2014/main" id="{5D165FC2-9974-61BE-7049-52A5D106C2B0}"/>
-              </a:ext>
-            </a:extLst>
-          </p:cNvPr>
-          <p:cNvSpPr>
-            <a:spLocks noGrp="1"/>
-          </p:cNvSpPr>
-          <p:nvPr>
-            <p:ph idx="1"/>
-          </p:nvPr>
-        </p:nvSpPr>
-        <p:spPr/>
-        <p:txBody>
-          <a:bodyPr/>
-          <a:lstStyle/>
-          <a:p>
-            <a:endParaRPr lang="en-CH" dirty="0"/>
-          </a:p>
-        </p:txBody>
-      </p:sp>
-      <p:sp>
-        <p:nvSpPr>
           <p:cNvPr id="4" name="TextBox 3">
             <a:extLst>
               <a:ext uri="{FF2B5EF4-FFF2-40B4-BE49-F238E27FC236}">
@@ -4712,8 +4662,123 @@
         </p:nvSpPr>
         <p:spPr>
           <a:xfrm>
-            <a:off x="609600" y="1690688"/>
-            <a:ext cx="19869094" cy="369332"/>
+            <a:off x="451520" y="279874"/>
+            <a:ext cx="10515599" cy="646331"/>
+          </a:xfrm>
+          <a:prstGeom prst="rect">
+            <a:avLst/>
+          </a:prstGeom>
+          <a:noFill/>
+        </p:spPr>
+        <p:txBody>
+          <a:bodyPr wrap="square" rtlCol="0">
+            <a:spAutoFit/>
+          </a:bodyPr>
+          <a:lstStyle/>
+          <a:p>
+            <a:r>
+              <a:rPr lang="en-US" dirty="0">
+                <a:solidFill>
+                  <a:srgbClr val="0070C0"/>
+                </a:solidFill>
+                <a:latin typeface="-apple-system"/>
+              </a:rPr>
+              <a:t>C</a:t>
+            </a:r>
+            <a:r>
+              <a:rPr lang="en-US" b="0" i="0" dirty="0">
+                <a:solidFill>
+                  <a:srgbClr val="0070C0"/>
+                </a:solidFill>
+                <a:effectLst/>
+                <a:latin typeface="-apple-system"/>
+              </a:rPr>
+              <a:t>an you please list the input parameter the following stored procedure Id just like to get a table with the parameters (name, data type, default value, purpose). The table should be formatted as a raw MD table.</a:t>
+            </a:r>
+            <a:endParaRPr lang="en-CH" dirty="0">
+              <a:solidFill>
+                <a:srgbClr val="0070C0"/>
+              </a:solidFill>
+            </a:endParaRPr>
+          </a:p>
+        </p:txBody>
+      </p:sp>
+      <p:pic>
+        <p:nvPicPr>
+          <p:cNvPr id="6" name="Picture 5">
+            <a:extLst>
+              <a:ext uri="{FF2B5EF4-FFF2-40B4-BE49-F238E27FC236}">
+                <a16:creationId xmlns:a16="http://schemas.microsoft.com/office/drawing/2014/main" id="{CFEAECF6-E3B6-0EC1-5F48-350D4FC4E154}"/>
+              </a:ext>
+            </a:extLst>
+          </p:cNvPr>
+          <p:cNvPicPr>
+            <a:picLocks noChangeAspect="1"/>
+          </p:cNvPicPr>
+          <p:nvPr/>
+        </p:nvPicPr>
+        <p:blipFill>
+          <a:blip r:embed="rId2"/>
+          <a:stretch>
+            <a:fillRect/>
+          </a:stretch>
+        </p:blipFill>
+        <p:spPr>
+          <a:xfrm>
+            <a:off x="564148" y="1089932"/>
+            <a:ext cx="1109696" cy="5100762"/>
+          </a:xfrm>
+          <a:prstGeom prst="rect">
+            <a:avLst/>
+          </a:prstGeom>
+        </p:spPr>
+      </p:pic>
+      <p:pic>
+        <p:nvPicPr>
+          <p:cNvPr id="8" name="Picture 7">
+            <a:extLst>
+              <a:ext uri="{FF2B5EF4-FFF2-40B4-BE49-F238E27FC236}">
+                <a16:creationId xmlns:a16="http://schemas.microsoft.com/office/drawing/2014/main" id="{64FA9513-33DB-0CCB-D459-6992611C3C5E}"/>
+              </a:ext>
+            </a:extLst>
+          </p:cNvPr>
+          <p:cNvPicPr>
+            <a:picLocks noChangeAspect="1"/>
+          </p:cNvPicPr>
+          <p:nvPr/>
+        </p:nvPicPr>
+        <p:blipFill>
+          <a:blip r:embed="rId3"/>
+          <a:stretch>
+            <a:fillRect/>
+          </a:stretch>
+        </p:blipFill>
+        <p:spPr>
+          <a:xfrm>
+            <a:off x="1895054" y="1073681"/>
+            <a:ext cx="3473243" cy="3524321"/>
+          </a:xfrm>
+          <a:prstGeom prst="rect">
+            <a:avLst/>
+          </a:prstGeom>
+        </p:spPr>
+      </p:pic>
+      <p:sp>
+        <p:nvSpPr>
+          <p:cNvPr id="9" name="TextBox 8">
+            <a:extLst>
+              <a:ext uri="{FF2B5EF4-FFF2-40B4-BE49-F238E27FC236}">
+                <a16:creationId xmlns:a16="http://schemas.microsoft.com/office/drawing/2014/main" id="{49AA7959-49CC-E9A9-67FD-50A4CCC437C4}"/>
+              </a:ext>
+            </a:extLst>
+          </p:cNvPr>
+          <p:cNvSpPr txBox="1"/>
+          <p:nvPr/>
+        </p:nvSpPr>
+        <p:spPr>
+          <a:xfrm>
+            <a:off x="2210161" y="5291386"/>
+            <a:ext cx="3725892" cy="369332"/>
           </a:xfrm>
           <a:prstGeom prst="rect">
             <a:avLst/>
@@ -4727,6 +4792,15 @@
           <a:lstStyle/>
           <a:p>
             <a:r>
+              <a:rPr lang="en-US" dirty="0">
+                <a:solidFill>
+                  <a:srgbClr val="0070C0"/>
+                </a:solidFill>
+                <a:latin typeface="-apple-system"/>
+              </a:rPr>
+              <a:t>C</a:t>
+            </a:r>
+            <a:r>
               <a:rPr lang="en-US" b="0" i="0" dirty="0">
                 <a:solidFill>
                   <a:srgbClr val="0070C0"/>
@@ -4734,11 +4808,410 @@
                 <a:effectLst/>
                 <a:latin typeface="-apple-system"/>
               </a:rPr>
-              <a:t>can you please list the input parameter the following stored procedure Id just like to get a table with the parameters (name, data type, default value, purpose). The table should be formatted as an raw MD table.</a:t>
+              <a:t>an you please generate the raw MD?</a:t>
             </a:r>
             <a:endParaRPr lang="en-CH" dirty="0">
               <a:solidFill>
                 <a:srgbClr val="0070C0"/>
+              </a:solidFill>
+            </a:endParaRPr>
+          </a:p>
+        </p:txBody>
+      </p:sp>
+      <p:sp>
+        <p:nvSpPr>
+          <p:cNvPr id="10" name="TextBox 9">
+            <a:extLst>
+              <a:ext uri="{FF2B5EF4-FFF2-40B4-BE49-F238E27FC236}">
+                <a16:creationId xmlns:a16="http://schemas.microsoft.com/office/drawing/2014/main" id="{8F9EB010-D921-E8F1-B083-4E4462B5D9E7}"/>
+              </a:ext>
+            </a:extLst>
+          </p:cNvPr>
+          <p:cNvSpPr txBox="1"/>
+          <p:nvPr/>
+        </p:nvSpPr>
+        <p:spPr>
+          <a:xfrm>
+            <a:off x="5490734" y="2268122"/>
+            <a:ext cx="6365845" cy="3016210"/>
+          </a:xfrm>
+          <a:prstGeom prst="rect">
+            <a:avLst/>
+          </a:prstGeom>
+          <a:solidFill>
+            <a:schemeClr val="tx1"/>
+          </a:solidFill>
+        </p:spPr>
+        <p:txBody>
+          <a:bodyPr wrap="none" rtlCol="0">
+            <a:spAutoFit/>
+          </a:bodyPr>
+          <a:lstStyle/>
+          <a:p>
+            <a:r>
+              <a:rPr lang="en-US" sz="1000" dirty="0">
+                <a:solidFill>
+                  <a:schemeClr val="bg1"/>
+                </a:solidFill>
+              </a:rPr>
+              <a:t>| Parameter Name | Data Type | Default Value | Purpose |</a:t>
+            </a:r>
+          </a:p>
+          <a:p>
+            <a:r>
+              <a:rPr lang="en-US" sz="1000" dirty="0">
+                <a:solidFill>
+                  <a:schemeClr val="bg1"/>
+                </a:solidFill>
+              </a:rPr>
+              <a:t>| --- | --- | --- | --- |</a:t>
+            </a:r>
+          </a:p>
+          <a:p>
+            <a:r>
+              <a:rPr lang="en-US" sz="1000" dirty="0">
+                <a:solidFill>
+                  <a:schemeClr val="bg1"/>
+                </a:solidFill>
+              </a:rPr>
+              <a:t>| @LowWaterMark | DATE | '2022.01.01' | The lower bound of the date range to generate slices for. |</a:t>
+            </a:r>
+          </a:p>
+          <a:p>
+            <a:r>
+              <a:rPr lang="en-US" sz="1000" dirty="0">
+                <a:solidFill>
+                  <a:schemeClr val="bg1"/>
+                </a:solidFill>
+              </a:rPr>
+              <a:t>| @HigWaterMark | DATE | '2022.03.01' | The upper bound of the date range to generate slices for. |</a:t>
+            </a:r>
+          </a:p>
+          <a:p>
+            <a:r>
+              <a:rPr lang="en-US" sz="1000" dirty="0">
+                <a:solidFill>
+                  <a:schemeClr val="bg1"/>
+                </a:solidFill>
+              </a:rPr>
+              <a:t>| @Resolution | VARCHAR(25) | 'day' | The resolution of the slices to generate. Can be 'day' or 'month'. |</a:t>
+            </a:r>
+          </a:p>
+          <a:p>
+            <a:r>
+              <a:rPr lang="en-US" sz="1000" dirty="0">
+                <a:solidFill>
+                  <a:schemeClr val="bg1"/>
+                </a:solidFill>
+              </a:rPr>
+              <a:t>| @SourceSystemName | </a:t>
+            </a:r>
+            <a:r>
+              <a:rPr lang="en-US" sz="1000" dirty="0" err="1">
+                <a:solidFill>
+                  <a:schemeClr val="bg1"/>
+                </a:solidFill>
+              </a:rPr>
+              <a:t>sysname</a:t>
+            </a:r>
+            <a:r>
+              <a:rPr lang="en-US" sz="1000" dirty="0">
+                <a:solidFill>
+                  <a:schemeClr val="bg1"/>
+                </a:solidFill>
+              </a:rPr>
+              <a:t> | NULL | The name of the source system. |</a:t>
+            </a:r>
+          </a:p>
+          <a:p>
+            <a:r>
+              <a:rPr lang="en-US" sz="1000" dirty="0">
+                <a:solidFill>
+                  <a:schemeClr val="bg1"/>
+                </a:solidFill>
+              </a:rPr>
+              <a:t>| @SourceSchema | </a:t>
+            </a:r>
+            <a:r>
+              <a:rPr lang="en-US" sz="1000" dirty="0" err="1">
+                <a:solidFill>
+                  <a:schemeClr val="bg1"/>
+                </a:solidFill>
+              </a:rPr>
+              <a:t>sysname</a:t>
+            </a:r>
+            <a:r>
+              <a:rPr lang="en-US" sz="1000" dirty="0">
+                <a:solidFill>
+                  <a:schemeClr val="bg1"/>
+                </a:solidFill>
+              </a:rPr>
+              <a:t> | NULL | The name of the source schema. |</a:t>
+            </a:r>
+          </a:p>
+          <a:p>
+            <a:r>
+              <a:rPr lang="en-US" sz="1000" dirty="0">
+                <a:solidFill>
+                  <a:schemeClr val="bg1"/>
+                </a:solidFill>
+              </a:rPr>
+              <a:t>| @SourceObject | </a:t>
+            </a:r>
+            <a:r>
+              <a:rPr lang="en-US" sz="1000" dirty="0" err="1">
+                <a:solidFill>
+                  <a:schemeClr val="bg1"/>
+                </a:solidFill>
+              </a:rPr>
+              <a:t>sysname</a:t>
+            </a:r>
+            <a:r>
+              <a:rPr lang="en-US" sz="1000" dirty="0">
+                <a:solidFill>
+                  <a:schemeClr val="bg1"/>
+                </a:solidFill>
+              </a:rPr>
+              <a:t> | NULL | The name of the source object. |</a:t>
+            </a:r>
+          </a:p>
+          <a:p>
+            <a:r>
+              <a:rPr lang="en-US" sz="1000" dirty="0">
+                <a:solidFill>
+                  <a:schemeClr val="bg1"/>
+                </a:solidFill>
+              </a:rPr>
+              <a:t>| @GetDataCommand | </a:t>
+            </a:r>
+            <a:r>
+              <a:rPr lang="en-US" sz="1000" dirty="0" err="1">
+                <a:solidFill>
+                  <a:schemeClr val="bg1"/>
+                </a:solidFill>
+              </a:rPr>
+              <a:t>nvarchar</a:t>
+            </a:r>
+            <a:r>
+              <a:rPr lang="en-US" sz="1000" dirty="0">
+                <a:solidFill>
+                  <a:schemeClr val="bg1"/>
+                </a:solidFill>
+              </a:rPr>
+              <a:t>(max) | NULL | The command to retrieve data from the source object. |</a:t>
+            </a:r>
+          </a:p>
+          <a:p>
+            <a:r>
+              <a:rPr lang="en-US" sz="1000" dirty="0">
+                <a:solidFill>
+                  <a:schemeClr val="bg1"/>
+                </a:solidFill>
+              </a:rPr>
+              <a:t>| @DateFilterAttributeName | </a:t>
+            </a:r>
+            <a:r>
+              <a:rPr lang="en-US" sz="1000" dirty="0" err="1">
+                <a:solidFill>
+                  <a:schemeClr val="bg1"/>
+                </a:solidFill>
+              </a:rPr>
+              <a:t>sysname</a:t>
+            </a:r>
+            <a:r>
+              <a:rPr lang="en-US" sz="1000" dirty="0">
+                <a:solidFill>
+                  <a:schemeClr val="bg1"/>
+                </a:solidFill>
+              </a:rPr>
+              <a:t> | NULL | The name of the date filter attribute. |</a:t>
+            </a:r>
+          </a:p>
+          <a:p>
+            <a:r>
+              <a:rPr lang="en-US" sz="1000" dirty="0">
+                <a:solidFill>
+                  <a:schemeClr val="bg1"/>
+                </a:solidFill>
+              </a:rPr>
+              <a:t>| @DateFilterAttributeType | </a:t>
+            </a:r>
+            <a:r>
+              <a:rPr lang="en-US" sz="1000" dirty="0" err="1">
+                <a:solidFill>
+                  <a:schemeClr val="bg1"/>
+                </a:solidFill>
+              </a:rPr>
+              <a:t>sysname</a:t>
+            </a:r>
+            <a:r>
+              <a:rPr lang="en-US" sz="1000" dirty="0">
+                <a:solidFill>
+                  <a:schemeClr val="bg1"/>
+                </a:solidFill>
+              </a:rPr>
+              <a:t> | NULL | The data type of the date filter attribute. |</a:t>
+            </a:r>
+          </a:p>
+          <a:p>
+            <a:r>
+              <a:rPr lang="en-US" sz="1000" dirty="0">
+                <a:solidFill>
+                  <a:schemeClr val="bg1"/>
+                </a:solidFill>
+              </a:rPr>
+              <a:t>| @DestinationSchema | </a:t>
+            </a:r>
+            <a:r>
+              <a:rPr lang="en-US" sz="1000" dirty="0" err="1">
+                <a:solidFill>
+                  <a:schemeClr val="bg1"/>
+                </a:solidFill>
+              </a:rPr>
+              <a:t>sysname</a:t>
+            </a:r>
+            <a:r>
+              <a:rPr lang="en-US" sz="1000" dirty="0">
+                <a:solidFill>
+                  <a:schemeClr val="bg1"/>
+                </a:solidFill>
+              </a:rPr>
+              <a:t> | NULL | The name of the destination schema. |</a:t>
+            </a:r>
+          </a:p>
+          <a:p>
+            <a:r>
+              <a:rPr lang="en-US" sz="1000" dirty="0">
+                <a:solidFill>
+                  <a:schemeClr val="bg1"/>
+                </a:solidFill>
+              </a:rPr>
+              <a:t>| @DestinationObject | </a:t>
+            </a:r>
+            <a:r>
+              <a:rPr lang="en-US" sz="1000" dirty="0" err="1">
+                <a:solidFill>
+                  <a:schemeClr val="bg1"/>
+                </a:solidFill>
+              </a:rPr>
+              <a:t>sysname</a:t>
+            </a:r>
+            <a:r>
+              <a:rPr lang="en-US" sz="1000" dirty="0">
+                <a:solidFill>
+                  <a:schemeClr val="bg1"/>
+                </a:solidFill>
+              </a:rPr>
+              <a:t> | NULL | The name of the destination object. |</a:t>
+            </a:r>
+          </a:p>
+          <a:p>
+            <a:r>
+              <a:rPr lang="en-US" sz="1000" dirty="0">
+                <a:solidFill>
+                  <a:schemeClr val="bg1"/>
+                </a:solidFill>
+              </a:rPr>
+              <a:t>| @ContainerName | </a:t>
+            </a:r>
+            <a:r>
+              <a:rPr lang="en-US" sz="1000" dirty="0" err="1">
+                <a:solidFill>
+                  <a:schemeClr val="bg1"/>
+                </a:solidFill>
+              </a:rPr>
+              <a:t>sysname</a:t>
+            </a:r>
+            <a:r>
+              <a:rPr lang="en-US" sz="1000" dirty="0">
+                <a:solidFill>
+                  <a:schemeClr val="bg1"/>
+                </a:solidFill>
+              </a:rPr>
+              <a:t> | NULL | The name of the container to store the slices in. |</a:t>
+            </a:r>
+          </a:p>
+          <a:p>
+            <a:r>
+              <a:rPr lang="en-US" sz="1000" dirty="0">
+                <a:solidFill>
+                  <a:schemeClr val="bg1"/>
+                </a:solidFill>
+              </a:rPr>
+              <a:t>| @AlternativeRootFolder | </a:t>
+            </a:r>
+            <a:r>
+              <a:rPr lang="en-US" sz="1000" dirty="0" err="1">
+                <a:solidFill>
+                  <a:schemeClr val="bg1"/>
+                </a:solidFill>
+              </a:rPr>
+              <a:t>sysname</a:t>
+            </a:r>
+            <a:r>
+              <a:rPr lang="en-US" sz="1000" dirty="0">
+                <a:solidFill>
+                  <a:schemeClr val="bg1"/>
+                </a:solidFill>
+              </a:rPr>
+              <a:t> | NULL | If provided, then this value is used instead of the @SourceSystemName </a:t>
+            </a:r>
+            <a:br>
+              <a:rPr lang="en-US" sz="1000" dirty="0">
+                <a:solidFill>
+                  <a:schemeClr val="bg1"/>
+                </a:solidFill>
+              </a:rPr>
+            </a:br>
+            <a:r>
+              <a:rPr lang="en-US" sz="1000" dirty="0">
+                <a:solidFill>
+                  <a:schemeClr val="bg1"/>
+                </a:solidFill>
+              </a:rPr>
+              <a:t>   to create the directory path. |</a:t>
+            </a:r>
+          </a:p>
+          <a:p>
+            <a:r>
+              <a:rPr lang="en-US" sz="1000" dirty="0">
+                <a:solidFill>
+                  <a:schemeClr val="bg1"/>
+                </a:solidFill>
+              </a:rPr>
+              <a:t>| @MaxRowsPerFile | int | NULL | The maximum number of rows to include in each slice file. |</a:t>
+            </a:r>
+          </a:p>
+          <a:p>
+            <a:r>
+              <a:rPr lang="en-US" sz="1000" dirty="0">
+                <a:solidFill>
+                  <a:schemeClr val="bg1"/>
+                </a:solidFill>
+              </a:rPr>
+              <a:t>| @IngestionMappingName | </a:t>
+            </a:r>
+            <a:r>
+              <a:rPr lang="en-US" sz="1000" dirty="0" err="1">
+                <a:solidFill>
+                  <a:schemeClr val="bg1"/>
+                </a:solidFill>
+              </a:rPr>
+              <a:t>sysname</a:t>
+            </a:r>
+            <a:r>
+              <a:rPr lang="en-US" sz="1000" dirty="0">
+                <a:solidFill>
+                  <a:schemeClr val="bg1"/>
+                </a:solidFill>
+              </a:rPr>
+              <a:t> | NULL | The name of the ingestion mapping to use. |</a:t>
+            </a:r>
+          </a:p>
+          <a:p>
+            <a:endParaRPr lang="en-CH" sz="1000" dirty="0">
+              <a:solidFill>
+                <a:schemeClr val="bg1"/>
               </a:solidFill>
             </a:endParaRPr>
           </a:p>

</xml_diff>

<commit_message>
Test data scripts and some mart objects added.
</commit_message>
<xml_diff>
--- a/docs/ADF_SynapsePipelines/PPT/SlicedDataMigrationToolbox.pptx
+++ b/docs/ADF_SynapsePipelines/PPT/SlicedDataMigrationToolbox.pptx
@@ -18,7 +18,8 @@
     <p:sldId id="263" r:id="rId12"/>
     <p:sldId id="265" r:id="rId13"/>
     <p:sldId id="266" r:id="rId14"/>
-    <p:sldId id="272" r:id="rId15"/>
+    <p:sldId id="273" r:id="rId15"/>
+    <p:sldId id="272" r:id="rId16"/>
   </p:sldIdLst>
   <p:sldSz cx="12192000" cy="6858000"/>
   <p:notesSz cx="6858000" cy="9144000"/>
@@ -274,7 +275,7 @@
           <a:p>
             <a:fld id="{3F429203-F5A3-4FEA-A348-783489DC56C4}" type="datetimeFigureOut">
               <a:rPr lang="en-CH" smtClean="0"/>
-              <a:t>09/05/2023</a:t>
+              <a:t>10/05/2023</a:t>
             </a:fld>
             <a:endParaRPr lang="en-CH"/>
           </a:p>
@@ -474,7 +475,7 @@
           <a:p>
             <a:fld id="{3F429203-F5A3-4FEA-A348-783489DC56C4}" type="datetimeFigureOut">
               <a:rPr lang="en-CH" smtClean="0"/>
-              <a:t>09/05/2023</a:t>
+              <a:t>10/05/2023</a:t>
             </a:fld>
             <a:endParaRPr lang="en-CH"/>
           </a:p>
@@ -684,7 +685,7 @@
           <a:p>
             <a:fld id="{3F429203-F5A3-4FEA-A348-783489DC56C4}" type="datetimeFigureOut">
               <a:rPr lang="en-CH" smtClean="0"/>
-              <a:t>09/05/2023</a:t>
+              <a:t>10/05/2023</a:t>
             </a:fld>
             <a:endParaRPr lang="en-CH"/>
           </a:p>
@@ -884,7 +885,7 @@
           <a:p>
             <a:fld id="{3F429203-F5A3-4FEA-A348-783489DC56C4}" type="datetimeFigureOut">
               <a:rPr lang="en-CH" smtClean="0"/>
-              <a:t>09/05/2023</a:t>
+              <a:t>10/05/2023</a:t>
             </a:fld>
             <a:endParaRPr lang="en-CH"/>
           </a:p>
@@ -1160,7 +1161,7 @@
           <a:p>
             <a:fld id="{3F429203-F5A3-4FEA-A348-783489DC56C4}" type="datetimeFigureOut">
               <a:rPr lang="en-CH" smtClean="0"/>
-              <a:t>09/05/2023</a:t>
+              <a:t>10/05/2023</a:t>
             </a:fld>
             <a:endParaRPr lang="en-CH"/>
           </a:p>
@@ -1428,7 +1429,7 @@
           <a:p>
             <a:fld id="{3F429203-F5A3-4FEA-A348-783489DC56C4}" type="datetimeFigureOut">
               <a:rPr lang="en-CH" smtClean="0"/>
-              <a:t>09/05/2023</a:t>
+              <a:t>10/05/2023</a:t>
             </a:fld>
             <a:endParaRPr lang="en-CH"/>
           </a:p>
@@ -1843,7 +1844,7 @@
           <a:p>
             <a:fld id="{3F429203-F5A3-4FEA-A348-783489DC56C4}" type="datetimeFigureOut">
               <a:rPr lang="en-CH" smtClean="0"/>
-              <a:t>09/05/2023</a:t>
+              <a:t>10/05/2023</a:t>
             </a:fld>
             <a:endParaRPr lang="en-CH"/>
           </a:p>
@@ -1985,7 +1986,7 @@
           <a:p>
             <a:fld id="{3F429203-F5A3-4FEA-A348-783489DC56C4}" type="datetimeFigureOut">
               <a:rPr lang="en-CH" smtClean="0"/>
-              <a:t>09/05/2023</a:t>
+              <a:t>10/05/2023</a:t>
             </a:fld>
             <a:endParaRPr lang="en-CH"/>
           </a:p>
@@ -2098,7 +2099,7 @@
           <a:p>
             <a:fld id="{3F429203-F5A3-4FEA-A348-783489DC56C4}" type="datetimeFigureOut">
               <a:rPr lang="en-CH" smtClean="0"/>
-              <a:t>09/05/2023</a:t>
+              <a:t>10/05/2023</a:t>
             </a:fld>
             <a:endParaRPr lang="en-CH"/>
           </a:p>
@@ -2411,7 +2412,7 @@
           <a:p>
             <a:fld id="{3F429203-F5A3-4FEA-A348-783489DC56C4}" type="datetimeFigureOut">
               <a:rPr lang="en-CH" smtClean="0"/>
-              <a:t>09/05/2023</a:t>
+              <a:t>10/05/2023</a:t>
             </a:fld>
             <a:endParaRPr lang="en-CH"/>
           </a:p>
@@ -2700,7 +2701,7 @@
           <a:p>
             <a:fld id="{3F429203-F5A3-4FEA-A348-783489DC56C4}" type="datetimeFigureOut">
               <a:rPr lang="en-CH" smtClean="0"/>
-              <a:t>09/05/2023</a:t>
+              <a:t>10/05/2023</a:t>
             </a:fld>
             <a:endParaRPr lang="en-CH"/>
           </a:p>
@@ -2943,7 +2944,7 @@
           <a:p>
             <a:fld id="{3F429203-F5A3-4FEA-A348-783489DC56C4}" type="datetimeFigureOut">
               <a:rPr lang="en-CH" smtClean="0"/>
-              <a:t>09/05/2023</a:t>
+              <a:t>10/05/2023</a:t>
             </a:fld>
             <a:endParaRPr lang="en-CH"/>
           </a:p>
@@ -11744,6 +11745,110 @@
 </file>
 
 <file path=ppt/slides/slide14.xml><?xml version="1.0" encoding="utf-8"?>
+<p:sld xmlns:a="http://schemas.openxmlformats.org/drawingml/2006/main" xmlns:r="http://schemas.openxmlformats.org/officeDocument/2006/relationships" xmlns:p="http://schemas.openxmlformats.org/presentationml/2006/main">
+  <p:cSld>
+    <p:spTree>
+      <p:nvGrpSpPr>
+        <p:cNvPr id="1" name=""/>
+        <p:cNvGrpSpPr/>
+        <p:nvPr/>
+      </p:nvGrpSpPr>
+      <p:grpSpPr>
+        <a:xfrm>
+          <a:off x="0" y="0"/>
+          <a:ext cx="0" cy="0"/>
+          <a:chOff x="0" y="0"/>
+          <a:chExt cx="0" cy="0"/>
+        </a:xfrm>
+      </p:grpSpPr>
+      <p:sp>
+        <p:nvSpPr>
+          <p:cNvPr id="2" name="Title 1">
+            <a:extLst>
+              <a:ext uri="{FF2B5EF4-FFF2-40B4-BE49-F238E27FC236}">
+                <a16:creationId xmlns:a16="http://schemas.microsoft.com/office/drawing/2014/main" id="{46ABCB7D-5BA3-FD9B-D578-ADAC7C8F9893}"/>
+              </a:ext>
+            </a:extLst>
+          </p:cNvPr>
+          <p:cNvSpPr>
+            <a:spLocks noGrp="1"/>
+          </p:cNvSpPr>
+          <p:nvPr>
+            <p:ph type="title"/>
+          </p:nvPr>
+        </p:nvSpPr>
+        <p:spPr/>
+        <p:txBody>
+          <a:bodyPr/>
+          <a:lstStyle/>
+          <a:p>
+            <a:endParaRPr lang="en-CH"/>
+          </a:p>
+        </p:txBody>
+      </p:sp>
+      <p:pic>
+        <p:nvPicPr>
+          <p:cNvPr id="1026" name="Picture 2" descr="Security considerations - Azure Data Factory | Microsoft Learn">
+            <a:extLst>
+              <a:ext uri="{FF2B5EF4-FFF2-40B4-BE49-F238E27FC236}">
+                <a16:creationId xmlns:a16="http://schemas.microsoft.com/office/drawing/2014/main" id="{7D88F53C-3C17-3018-70BC-73E306F7B750}"/>
+              </a:ext>
+            </a:extLst>
+          </p:cNvPr>
+          <p:cNvPicPr>
+            <a:picLocks noGrp="1" noChangeAspect="1" noChangeArrowheads="1"/>
+          </p:cNvPicPr>
+          <p:nvPr>
+            <p:ph idx="1"/>
+          </p:nvPr>
+        </p:nvPicPr>
+        <p:blipFill>
+          <a:blip r:embed="rId2">
+            <a:extLst>
+              <a:ext uri="{28A0092B-C50C-407E-A947-70E740481C1C}">
+                <a14:useLocalDpi xmlns:a14="http://schemas.microsoft.com/office/drawing/2010/main" val="0"/>
+              </a:ext>
+            </a:extLst>
+          </a:blip>
+          <a:srcRect/>
+          <a:stretch>
+            <a:fillRect/>
+          </a:stretch>
+        </p:blipFill>
+        <p:spPr bwMode="auto">
+          <a:xfrm>
+            <a:off x="1401287" y="1825625"/>
+            <a:ext cx="9389426" cy="4351338"/>
+          </a:xfrm>
+          <a:prstGeom prst="rect">
+            <a:avLst/>
+          </a:prstGeom>
+          <a:noFill/>
+          <a:extLst>
+            <a:ext uri="{909E8E84-426E-40DD-AFC4-6F175D3DCCD1}">
+              <a14:hiddenFill xmlns:a14="http://schemas.microsoft.com/office/drawing/2010/main">
+                <a:solidFill>
+                  <a:srgbClr val="FFFFFF"/>
+                </a:solidFill>
+              </a14:hiddenFill>
+            </a:ext>
+          </a:extLst>
+        </p:spPr>
+      </p:pic>
+    </p:spTree>
+    <p:extLst>
+      <p:ext uri="{BB962C8B-B14F-4D97-AF65-F5344CB8AC3E}">
+        <p14:creationId xmlns:p14="http://schemas.microsoft.com/office/powerpoint/2010/main" val="2280752573"/>
+      </p:ext>
+    </p:extLst>
+  </p:cSld>
+  <p:clrMapOvr>
+    <a:masterClrMapping/>
+  </p:clrMapOvr>
+</p:sld>
+</file>
+
+<file path=ppt/slides/slide15.xml><?xml version="1.0" encoding="utf-8"?>
 <p:sld xmlns:a="http://schemas.openxmlformats.org/drawingml/2006/main" xmlns:r="http://schemas.openxmlformats.org/officeDocument/2006/relationships" xmlns:p="http://schemas.openxmlformats.org/presentationml/2006/main">
   <p:cSld>
     <p:spTree>

</xml_diff>

<commit_message>
Link between Extents and Pipeline run id added.
</commit_message>
<xml_diff>
--- a/docs/ADF_SynapsePipelines/PPT/SlicedDataMigrationToolbox.pptx
+++ b/docs/ADF_SynapsePipelines/PPT/SlicedDataMigrationToolbox.pptx
@@ -220,7 +220,7 @@
           <a:p>
             <a:fld id="{CCE1C4A2-B8EC-4E0A-8DE6-A3B69B64B700}" type="datetimeFigureOut">
               <a:rPr lang="en-CH" smtClean="0"/>
-              <a:t>11/05/2023</a:t>
+              <a:t>12/05/2023</a:t>
             </a:fld>
             <a:endParaRPr lang="en-CH"/>
           </a:p>
@@ -1322,7 +1322,7 @@
           <a:p>
             <a:fld id="{3F429203-F5A3-4FEA-A348-783489DC56C4}" type="datetimeFigureOut">
               <a:rPr lang="en-CH" smtClean="0"/>
-              <a:t>11/05/2023</a:t>
+              <a:t>12/05/2023</a:t>
             </a:fld>
             <a:endParaRPr lang="en-CH"/>
           </a:p>
@@ -1522,7 +1522,7 @@
           <a:p>
             <a:fld id="{3F429203-F5A3-4FEA-A348-783489DC56C4}" type="datetimeFigureOut">
               <a:rPr lang="en-CH" smtClean="0"/>
-              <a:t>11/05/2023</a:t>
+              <a:t>12/05/2023</a:t>
             </a:fld>
             <a:endParaRPr lang="en-CH"/>
           </a:p>
@@ -1732,7 +1732,7 @@
           <a:p>
             <a:fld id="{3F429203-F5A3-4FEA-A348-783489DC56C4}" type="datetimeFigureOut">
               <a:rPr lang="en-CH" smtClean="0"/>
-              <a:t>11/05/2023</a:t>
+              <a:t>12/05/2023</a:t>
             </a:fld>
             <a:endParaRPr lang="en-CH"/>
           </a:p>
@@ -1932,7 +1932,7 @@
           <a:p>
             <a:fld id="{3F429203-F5A3-4FEA-A348-783489DC56C4}" type="datetimeFigureOut">
               <a:rPr lang="en-CH" smtClean="0"/>
-              <a:t>11/05/2023</a:t>
+              <a:t>12/05/2023</a:t>
             </a:fld>
             <a:endParaRPr lang="en-CH"/>
           </a:p>
@@ -2208,7 +2208,7 @@
           <a:p>
             <a:fld id="{3F429203-F5A3-4FEA-A348-783489DC56C4}" type="datetimeFigureOut">
               <a:rPr lang="en-CH" smtClean="0"/>
-              <a:t>11/05/2023</a:t>
+              <a:t>12/05/2023</a:t>
             </a:fld>
             <a:endParaRPr lang="en-CH"/>
           </a:p>
@@ -2476,7 +2476,7 @@
           <a:p>
             <a:fld id="{3F429203-F5A3-4FEA-A348-783489DC56C4}" type="datetimeFigureOut">
               <a:rPr lang="en-CH" smtClean="0"/>
-              <a:t>11/05/2023</a:t>
+              <a:t>12/05/2023</a:t>
             </a:fld>
             <a:endParaRPr lang="en-CH"/>
           </a:p>
@@ -2891,7 +2891,7 @@
           <a:p>
             <a:fld id="{3F429203-F5A3-4FEA-A348-783489DC56C4}" type="datetimeFigureOut">
               <a:rPr lang="en-CH" smtClean="0"/>
-              <a:t>11/05/2023</a:t>
+              <a:t>12/05/2023</a:t>
             </a:fld>
             <a:endParaRPr lang="en-CH"/>
           </a:p>
@@ -3033,7 +3033,7 @@
           <a:p>
             <a:fld id="{3F429203-F5A3-4FEA-A348-783489DC56C4}" type="datetimeFigureOut">
               <a:rPr lang="en-CH" smtClean="0"/>
-              <a:t>11/05/2023</a:t>
+              <a:t>12/05/2023</a:t>
             </a:fld>
             <a:endParaRPr lang="en-CH"/>
           </a:p>
@@ -3146,7 +3146,7 @@
           <a:p>
             <a:fld id="{3F429203-F5A3-4FEA-A348-783489DC56C4}" type="datetimeFigureOut">
               <a:rPr lang="en-CH" smtClean="0"/>
-              <a:t>11/05/2023</a:t>
+              <a:t>12/05/2023</a:t>
             </a:fld>
             <a:endParaRPr lang="en-CH"/>
           </a:p>
@@ -3459,7 +3459,7 @@
           <a:p>
             <a:fld id="{3F429203-F5A3-4FEA-A348-783489DC56C4}" type="datetimeFigureOut">
               <a:rPr lang="en-CH" smtClean="0"/>
-              <a:t>11/05/2023</a:t>
+              <a:t>12/05/2023</a:t>
             </a:fld>
             <a:endParaRPr lang="en-CH"/>
           </a:p>
@@ -3748,7 +3748,7 @@
           <a:p>
             <a:fld id="{3F429203-F5A3-4FEA-A348-783489DC56C4}" type="datetimeFigureOut">
               <a:rPr lang="en-CH" smtClean="0"/>
-              <a:t>11/05/2023</a:t>
+              <a:t>12/05/2023</a:t>
             </a:fld>
             <a:endParaRPr lang="en-CH"/>
           </a:p>
@@ -3991,7 +3991,7 @@
           <a:p>
             <a:fld id="{3F429203-F5A3-4FEA-A348-783489DC56C4}" type="datetimeFigureOut">
               <a:rPr lang="en-CH" smtClean="0"/>
-              <a:t>11/05/2023</a:t>
+              <a:t>12/05/2023</a:t>
             </a:fld>
             <a:endParaRPr lang="en-CH"/>
           </a:p>
@@ -8527,19 +8527,15 @@
             </a:br>
             <a:r>
               <a:rPr lang="en-US" dirty="0"/>
-              <a:t>| where </a:t>
-            </a:r>
-            <a:r>
-              <a:rPr lang="en-US" dirty="0" err="1"/>
-              <a:t>MinCreatedOn</a:t>
+              <a:t>     where tags has '</a:t>
+            </a:r>
+            <a:r>
+              <a:rPr lang="en-US" b="1" dirty="0"/>
+              <a:t>ExtentFingerprint:20211126</a:t>
             </a:r>
             <a:r>
               <a:rPr lang="en-US" dirty="0"/>
-              <a:t> == </a:t>
-            </a:r>
-            <a:r>
-              <a:rPr lang="en-US" b="1" dirty="0"/>
-              <a:t>'2021-11-26'</a:t>
+              <a:t>'</a:t>
             </a:r>
             <a:endParaRPr lang="en-CH" b="1" dirty="0"/>
           </a:p>
@@ -8559,7 +8555,7 @@
         </p:nvSpPr>
         <p:spPr>
           <a:xfrm>
-            <a:off x="6485353" y="5676552"/>
+            <a:off x="6475774" y="5653273"/>
             <a:ext cx="4185761" cy="861774"/>
           </a:xfrm>
           <a:prstGeom prst="rect">
@@ -8614,38 +8610,26 @@
           <a:p>
             <a:r>
               <a:rPr lang="en-US" dirty="0"/>
-              <a:t> ,"tags":</a:t>
-            </a:r>
-            <a:br>
+              <a:t>  ,"tags":["LoadedAt:2023-05-12T07:51:32.343"</a:t>
+            </a:r>
+          </a:p>
+          <a:p>
+            <a:r>
               <a:rPr lang="en-US" dirty="0"/>
-            </a:br>
+              <a:t>          ,"SlicedImportObject_Id:4FC9A0FF-…A23E7F7"</a:t>
+            </a:r>
+          </a:p>
+          <a:p>
             <a:r>
               <a:rPr lang="en-US" dirty="0"/>
-              <a:t>   ["</a:t>
-            </a:r>
-            <a:r>
-              <a:rPr lang="en-US" dirty="0" err="1"/>
-              <a:t>Source:PipelineLoad</a:t>
-            </a:r>
-            <a:r>
-              <a:rPr lang="en-US" dirty="0"/>
-              <a:t>"</a:t>
-            </a:r>
-            <a:br>
-              <a:rPr lang="en-US" dirty="0"/>
-            </a:br>
-            <a:r>
-              <a:rPr lang="en-US" dirty="0"/>
-              <a:t>   ,"LoadedAt:2023-05-10T15:02:19.950"</a:t>
-            </a:r>
-            <a:br>
-              <a:rPr lang="en-US" dirty="0"/>
-            </a:br>
-            <a:r>
-              <a:rPr lang="en-US" dirty="0"/>
-              <a:t>   ,"SlicedImportObject_Id:D42A5692…-000D3A23E7F7"]}</a:t>
-            </a:r>
-            <a:endParaRPr lang="en-CH" dirty="0"/>
+              <a:t>          ,"PipelineRun_Id:04d26153-99b6-4…710ca6d2"</a:t>
+            </a:r>
+          </a:p>
+          <a:p>
+            <a:r>
+              <a:rPr lang="en-US" b="1" dirty="0"/>
+              <a:t>          ,"ExtentFingerprint:20211126"]}</a:t>
+            </a:r>
           </a:p>
         </p:txBody>
       </p:sp>
@@ -8703,10 +8687,10 @@
           </a:lstStyle>
           <a:p>
             <a:r>
-              <a:rPr lang="en-US" dirty="0"/>
+              <a:rPr lang="en-US" b="1" dirty="0"/>
               <a:t>Measurement</a:t>
             </a:r>
-            <a:endParaRPr lang="en-CH" dirty="0"/>
+            <a:endParaRPr lang="en-CH" b="1" dirty="0"/>
           </a:p>
         </p:txBody>
       </p:sp>
@@ -11803,12 +11787,238 @@
           </a:p>
         </p:txBody>
       </p:sp>
+      <p:pic>
+        <p:nvPicPr>
+          <p:cNvPr id="4" name="Picture 6" descr="Azure Data Lake Storage Connector - Mule 4">
+            <a:extLst>
+              <a:ext uri="{FF2B5EF4-FFF2-40B4-BE49-F238E27FC236}">
+                <a16:creationId xmlns:a16="http://schemas.microsoft.com/office/drawing/2014/main" id="{C2FD712E-F9E7-5ED9-C701-483117D29BBA}"/>
+              </a:ext>
+            </a:extLst>
+          </p:cNvPr>
+          <p:cNvPicPr>
+            <a:picLocks noChangeAspect="1" noChangeArrowheads="1"/>
+          </p:cNvPicPr>
+          <p:nvPr/>
+        </p:nvPicPr>
+        <p:blipFill rotWithShape="1">
+          <a:blip r:embed="rId10">
+            <a:extLst>
+              <a:ext uri="{28A0092B-C50C-407E-A947-70E740481C1C}">
+                <a14:useLocalDpi xmlns:a14="http://schemas.microsoft.com/office/drawing/2010/main" val="0"/>
+              </a:ext>
+            </a:extLst>
+          </a:blip>
+          <a:srcRect l="8924" r="9672"/>
+          <a:stretch/>
+        </p:blipFill>
+        <p:spPr bwMode="auto">
+          <a:xfrm>
+            <a:off x="5329229" y="2187529"/>
+            <a:ext cx="772404" cy="1048629"/>
+          </a:xfrm>
+          <a:prstGeom prst="rect">
+            <a:avLst/>
+          </a:prstGeom>
+          <a:noFill/>
+          <a:extLst>
+            <a:ext uri="{909E8E84-426E-40DD-AFC4-6F175D3DCCD1}">
+              <a14:hiddenFill xmlns:a14="http://schemas.microsoft.com/office/drawing/2010/main">
+                <a:solidFill>
+                  <a:srgbClr val="FFFFFF"/>
+                </a:solidFill>
+              </a14:hiddenFill>
+            </a:ext>
+          </a:extLst>
+        </p:spPr>
+      </p:pic>
+      <p:pic>
+        <p:nvPicPr>
+          <p:cNvPr id="5" name="Picture 4">
+            <a:extLst>
+              <a:ext uri="{FF2B5EF4-FFF2-40B4-BE49-F238E27FC236}">
+                <a16:creationId xmlns:a16="http://schemas.microsoft.com/office/drawing/2014/main" id="{92B2C62E-D9C0-5193-A51F-71D4CDA59BCD}"/>
+              </a:ext>
+            </a:extLst>
+          </p:cNvPr>
+          <p:cNvPicPr>
+            <a:picLocks noChangeAspect="1"/>
+          </p:cNvPicPr>
+          <p:nvPr/>
+        </p:nvPicPr>
+        <p:blipFill>
+          <a:blip r:embed="rId11"/>
+          <a:stretch>
+            <a:fillRect/>
+          </a:stretch>
+        </p:blipFill>
+        <p:spPr>
+          <a:xfrm>
+            <a:off x="4148699" y="3066881"/>
+            <a:ext cx="2219341" cy="2781320"/>
+          </a:xfrm>
+          <a:prstGeom prst="rect">
+            <a:avLst/>
+          </a:prstGeom>
+          <a:ln>
+            <a:solidFill>
+              <a:schemeClr val="tx1">
+                <a:lumMod val="50000"/>
+                <a:lumOff val="50000"/>
+              </a:schemeClr>
+            </a:solidFill>
+          </a:ln>
+        </p:spPr>
+      </p:pic>
+      <p:cxnSp>
+        <p:nvCxnSpPr>
+          <p:cNvPr id="11" name="Straight Arrow Connector 10">
+            <a:extLst>
+              <a:ext uri="{FF2B5EF4-FFF2-40B4-BE49-F238E27FC236}">
+                <a16:creationId xmlns:a16="http://schemas.microsoft.com/office/drawing/2014/main" id="{32BA13E2-700C-39F2-1E77-403811AE3AE0}"/>
+              </a:ext>
+            </a:extLst>
+          </p:cNvPr>
+          <p:cNvCxnSpPr>
+            <a:cxnSpLocks/>
+            <a:endCxn id="9" idx="1"/>
+          </p:cNvCxnSpPr>
+          <p:nvPr/>
+        </p:nvCxnSpPr>
+        <p:spPr>
+          <a:xfrm>
+            <a:off x="5303325" y="5672145"/>
+            <a:ext cx="386305" cy="225235"/>
+          </a:xfrm>
+          <a:prstGeom prst="straightConnector1">
+            <a:avLst/>
+          </a:prstGeom>
+          <a:ln>
+            <a:solidFill>
+              <a:schemeClr val="tx1">
+                <a:lumMod val="85000"/>
+                <a:lumOff val="15000"/>
+              </a:schemeClr>
+            </a:solidFill>
+            <a:tailEnd type="triangle"/>
+          </a:ln>
+        </p:spPr>
+        <p:style>
+          <a:lnRef idx="1">
+            <a:schemeClr val="accent1"/>
+          </a:lnRef>
+          <a:fillRef idx="0">
+            <a:schemeClr val="accent1"/>
+          </a:fillRef>
+          <a:effectRef idx="0">
+            <a:schemeClr val="accent1"/>
+          </a:effectRef>
+          <a:fontRef idx="minor">
+            <a:schemeClr val="tx1"/>
+          </a:fontRef>
+        </p:style>
+      </p:cxnSp>
+      <p:cxnSp>
+        <p:nvCxnSpPr>
+          <p:cNvPr id="18" name="Straight Arrow Connector 17">
+            <a:extLst>
+              <a:ext uri="{FF2B5EF4-FFF2-40B4-BE49-F238E27FC236}">
+                <a16:creationId xmlns:a16="http://schemas.microsoft.com/office/drawing/2014/main" id="{AD6D0765-0D72-5446-8F3F-CD198A33CA6C}"/>
+              </a:ext>
+            </a:extLst>
+          </p:cNvPr>
+          <p:cNvCxnSpPr>
+            <a:cxnSpLocks/>
+            <a:endCxn id="10" idx="1"/>
+          </p:cNvCxnSpPr>
+          <p:nvPr/>
+        </p:nvCxnSpPr>
+        <p:spPr>
+          <a:xfrm flipV="1">
+            <a:off x="5329229" y="5088152"/>
+            <a:ext cx="379452" cy="251117"/>
+          </a:xfrm>
+          <a:prstGeom prst="straightConnector1">
+            <a:avLst/>
+          </a:prstGeom>
+          <a:ln>
+            <a:solidFill>
+              <a:schemeClr val="tx1">
+                <a:lumMod val="85000"/>
+                <a:lumOff val="15000"/>
+              </a:schemeClr>
+            </a:solidFill>
+            <a:tailEnd type="triangle"/>
+          </a:ln>
+        </p:spPr>
+        <p:style>
+          <a:lnRef idx="1">
+            <a:schemeClr val="accent1"/>
+          </a:lnRef>
+          <a:fillRef idx="0">
+            <a:schemeClr val="accent1"/>
+          </a:fillRef>
+          <a:effectRef idx="0">
+            <a:schemeClr val="accent1"/>
+          </a:effectRef>
+          <a:fontRef idx="minor">
+            <a:schemeClr val="tx1"/>
+          </a:fontRef>
+        </p:style>
+      </p:cxnSp>
+      <p:cxnSp>
+        <p:nvCxnSpPr>
+          <p:cNvPr id="19" name="Straight Arrow Connector 18">
+            <a:extLst>
+              <a:ext uri="{FF2B5EF4-FFF2-40B4-BE49-F238E27FC236}">
+                <a16:creationId xmlns:a16="http://schemas.microsoft.com/office/drawing/2014/main" id="{8ED55D3A-1377-27FE-7398-A2B431E258E2}"/>
+              </a:ext>
+            </a:extLst>
+          </p:cNvPr>
+          <p:cNvCxnSpPr>
+            <a:cxnSpLocks/>
+          </p:cNvCxnSpPr>
+          <p:nvPr/>
+        </p:nvCxnSpPr>
+        <p:spPr>
+          <a:xfrm flipV="1">
+            <a:off x="5303325" y="4285365"/>
+            <a:ext cx="386305" cy="753608"/>
+          </a:xfrm>
+          <a:prstGeom prst="straightConnector1">
+            <a:avLst/>
+          </a:prstGeom>
+          <a:ln>
+            <a:solidFill>
+              <a:schemeClr val="tx1">
+                <a:lumMod val="85000"/>
+                <a:lumOff val="15000"/>
+              </a:schemeClr>
+            </a:solidFill>
+            <a:tailEnd type="triangle"/>
+          </a:ln>
+        </p:spPr>
+        <p:style>
+          <a:lnRef idx="1">
+            <a:schemeClr val="accent1"/>
+          </a:lnRef>
+          <a:fillRef idx="0">
+            <a:schemeClr val="accent1"/>
+          </a:fillRef>
+          <a:effectRef idx="0">
+            <a:schemeClr val="accent1"/>
+          </a:effectRef>
+          <a:fontRef idx="minor">
+            <a:schemeClr val="tx1"/>
+          </a:fontRef>
+        </p:style>
+      </p:cxnSp>
       <p:sp>
         <p:nvSpPr>
-          <p:cNvPr id="3" name="Callout: Bent Line 2">
-            <a:extLst>
-              <a:ext uri="{FF2B5EF4-FFF2-40B4-BE49-F238E27FC236}">
-                <a16:creationId xmlns:a16="http://schemas.microsoft.com/office/drawing/2014/main" id="{D1A05C7F-9E6F-CFE5-3189-471087EEEC10}"/>
+          <p:cNvPr id="8" name="Callout: Bent Line 7">
+            <a:extLst>
+              <a:ext uri="{FF2B5EF4-FFF2-40B4-BE49-F238E27FC236}">
+                <a16:creationId xmlns:a16="http://schemas.microsoft.com/office/drawing/2014/main" id="{E3CAB93F-C1AA-9518-7412-2C41377C0949}"/>
               </a:ext>
             </a:extLst>
           </p:cNvPr>
@@ -11866,253 +12076,131 @@
           <a:lstStyle/>
           <a:p>
             <a:r>
-              <a:rPr lang="de-CH" sz="1100" b="0" dirty="0">
+              <a:rPr lang="de-CH" sz="1000" dirty="0">
                 <a:solidFill>
                   <a:srgbClr val="212121"/>
                 </a:solidFill>
-                <a:effectLst/>
-                <a:latin typeface="Consolas" panose="020B0609020204030204" pitchFamily="49" charset="0"/>
-              </a:rPr>
-              <a:t>{</a:t>
-            </a:r>
-            <a:r>
-              <a:rPr lang="de-CH" sz="1100" b="1" dirty="0">
-                <a:solidFill>
-                  <a:srgbClr val="0451A5"/>
-                </a:solidFill>
-                <a:effectLst/>
-                <a:latin typeface="Consolas" panose="020B0609020204030204" pitchFamily="49" charset="0"/>
-              </a:rPr>
-              <a:t>"</a:t>
-            </a:r>
-            <a:r>
-              <a:rPr lang="de-CH" sz="1100" b="1" dirty="0" err="1">
-                <a:solidFill>
-                  <a:srgbClr val="0451A5"/>
-                </a:solidFill>
-                <a:effectLst/>
-                <a:latin typeface="Consolas" panose="020B0609020204030204" pitchFamily="49" charset="0"/>
+                <a:latin typeface="Courier New" panose="02070309020205020404" pitchFamily="49" charset="0"/>
+                <a:cs typeface="Courier New" panose="02070309020205020404" pitchFamily="49" charset="0"/>
+              </a:rPr>
+              <a:t>{"</a:t>
+            </a:r>
+            <a:r>
+              <a:rPr lang="de-CH" sz="1000" b="1" dirty="0" err="1">
+                <a:solidFill>
+                  <a:srgbClr val="212121"/>
+                </a:solidFill>
+                <a:latin typeface="Courier New" panose="02070309020205020404" pitchFamily="49" charset="0"/>
+                <a:cs typeface="Courier New" panose="02070309020205020404" pitchFamily="49" charset="0"/>
               </a:rPr>
               <a:t>creationTime</a:t>
             </a:r>
             <a:r>
-              <a:rPr lang="de-CH" sz="1100" b="1" dirty="0">
-                <a:solidFill>
-                  <a:srgbClr val="0451A5"/>
-                </a:solidFill>
-                <a:effectLst/>
-                <a:latin typeface="Consolas" panose="020B0609020204030204" pitchFamily="49" charset="0"/>
-              </a:rPr>
-              <a:t>"</a:t>
-            </a:r>
-            <a:r>
-              <a:rPr lang="de-CH" sz="1100" b="1" dirty="0">
+              <a:rPr lang="de-CH" sz="1000" b="1" dirty="0">
                 <a:solidFill>
                   <a:srgbClr val="212121"/>
                 </a:solidFill>
-                <a:effectLst/>
-                <a:latin typeface="Consolas" panose="020B0609020204030204" pitchFamily="49" charset="0"/>
-              </a:rPr>
-              <a:t>: </a:t>
-            </a:r>
-            <a:r>
-              <a:rPr lang="de-CH" sz="1100" b="1" dirty="0">
-                <a:solidFill>
-                  <a:srgbClr val="A31515"/>
-                </a:solidFill>
-                <a:effectLst/>
-                <a:latin typeface="Consolas" panose="020B0609020204030204" pitchFamily="49" charset="0"/>
-              </a:rPr>
-              <a:t>"2021-11-25"</a:t>
-            </a:r>
-            <a:r>
-              <a:rPr lang="de-CH" sz="1100" b="1" dirty="0">
+                <a:latin typeface="Courier New" panose="02070309020205020404" pitchFamily="49" charset="0"/>
+                <a:cs typeface="Courier New" panose="02070309020205020404" pitchFamily="49" charset="0"/>
+              </a:rPr>
+              <a:t>": "2021-11-25"</a:t>
+            </a:r>
+          </a:p>
+          <a:p>
+            <a:r>
+              <a:rPr lang="de-CH" sz="1000" dirty="0">
                 <a:solidFill>
                   <a:srgbClr val="212121"/>
                 </a:solidFill>
-                <a:effectLst/>
-                <a:latin typeface="Consolas" panose="020B0609020204030204" pitchFamily="49" charset="0"/>
-              </a:rPr>
-              <a:t>,</a:t>
-            </a:r>
-          </a:p>
-          <a:p>
-            <a:r>
-              <a:rPr lang="de-CH" sz="1100" b="0" dirty="0">
+                <a:latin typeface="Courier New" panose="02070309020205020404" pitchFamily="49" charset="0"/>
+                <a:cs typeface="Courier New" panose="02070309020205020404" pitchFamily="49" charset="0"/>
+              </a:rPr>
+              <a:t>  ,"tags":</a:t>
+            </a:r>
+            <a:br>
+              <a:rPr lang="de-CH" sz="1000" dirty="0">
                 <a:solidFill>
                   <a:srgbClr val="212121"/>
                 </a:solidFill>
-                <a:effectLst/>
-                <a:latin typeface="Consolas" panose="020B0609020204030204" pitchFamily="49" charset="0"/>
-              </a:rPr>
-              <a:t> </a:t>
-            </a:r>
-            <a:r>
-              <a:rPr lang="de-CH" sz="1100" b="0" dirty="0">
-                <a:solidFill>
-                  <a:srgbClr val="0451A5"/>
-                </a:solidFill>
-                <a:effectLst/>
-                <a:latin typeface="Consolas" panose="020B0609020204030204" pitchFamily="49" charset="0"/>
-              </a:rPr>
-              <a:t>"tags"</a:t>
-            </a:r>
-            <a:r>
-              <a:rPr lang="de-CH" sz="1100" b="0" dirty="0">
+                <a:latin typeface="Courier New" panose="02070309020205020404" pitchFamily="49" charset="0"/>
+                <a:cs typeface="Courier New" panose="02070309020205020404" pitchFamily="49" charset="0"/>
+              </a:rPr>
+            </a:br>
+            <a:r>
+              <a:rPr lang="de-CH" sz="1000" dirty="0">
                 <a:solidFill>
                   <a:srgbClr val="212121"/>
                 </a:solidFill>
-                <a:effectLst/>
-                <a:latin typeface="Consolas" panose="020B0609020204030204" pitchFamily="49" charset="0"/>
-              </a:rPr>
-              <a:t>: </a:t>
-            </a:r>
-          </a:p>
-          <a:p>
-            <a:r>
-              <a:rPr lang="de-CH" sz="1100" dirty="0">
+                <a:latin typeface="Courier New" panose="02070309020205020404" pitchFamily="49" charset="0"/>
+                <a:cs typeface="Courier New" panose="02070309020205020404" pitchFamily="49" charset="0"/>
+              </a:rPr>
+              <a:t>    ["LoadedAt:2023-05-12T07:51:32.343"</a:t>
+            </a:r>
+          </a:p>
+          <a:p>
+            <a:r>
+              <a:rPr lang="de-CH" sz="1000" dirty="0">
                 <a:solidFill>
                   <a:srgbClr val="212121"/>
                 </a:solidFill>
-                <a:latin typeface="Consolas" panose="020B0609020204030204" pitchFamily="49" charset="0"/>
-              </a:rPr>
-              <a:t>   </a:t>
-            </a:r>
-            <a:r>
-              <a:rPr lang="de-CH" sz="1100" b="0" dirty="0">
+                <a:latin typeface="Courier New" panose="02070309020205020404" pitchFamily="49" charset="0"/>
+                <a:cs typeface="Courier New" panose="02070309020205020404" pitchFamily="49" charset="0"/>
+              </a:rPr>
+              <a:t>    ,"SlicedImportObject_Id:4FC9A0…A23E7F7"</a:t>
+            </a:r>
+          </a:p>
+          <a:p>
+            <a:r>
+              <a:rPr lang="de-CH" sz="1000" dirty="0">
                 <a:solidFill>
                   <a:srgbClr val="212121"/>
                 </a:solidFill>
-                <a:effectLst/>
-                <a:latin typeface="Consolas" panose="020B0609020204030204" pitchFamily="49" charset="0"/>
-              </a:rPr>
-              <a:t>[</a:t>
-            </a:r>
-            <a:r>
-              <a:rPr lang="de-CH" sz="1100" b="0" dirty="0">
-                <a:solidFill>
-                  <a:srgbClr val="A31515"/>
-                </a:solidFill>
-                <a:effectLst/>
-                <a:latin typeface="Consolas" panose="020B0609020204030204" pitchFamily="49" charset="0"/>
-              </a:rPr>
-              <a:t>"</a:t>
-            </a:r>
-            <a:r>
-              <a:rPr lang="de-CH" sz="1100" b="0" dirty="0" err="1">
-                <a:solidFill>
-                  <a:srgbClr val="A31515"/>
-                </a:solidFill>
-                <a:effectLst/>
-                <a:latin typeface="Consolas" panose="020B0609020204030204" pitchFamily="49" charset="0"/>
-              </a:rPr>
-              <a:t>Source:PipelineLoad</a:t>
-            </a:r>
-            <a:r>
-              <a:rPr lang="de-CH" sz="1100" b="0" dirty="0">
-                <a:solidFill>
-                  <a:srgbClr val="A31515"/>
-                </a:solidFill>
-                <a:effectLst/>
-                <a:latin typeface="Consolas" panose="020B0609020204030204" pitchFamily="49" charset="0"/>
-              </a:rPr>
-              <a:t>"</a:t>
-            </a:r>
-            <a:r>
-              <a:rPr lang="de-CH" sz="1100" b="0" dirty="0">
+                <a:latin typeface="Courier New" panose="02070309020205020404" pitchFamily="49" charset="0"/>
+                <a:cs typeface="Courier New" panose="02070309020205020404" pitchFamily="49" charset="0"/>
+              </a:rPr>
+              <a:t>    ,"PipelineRun_Id:04d26153-99…710ca6d2"</a:t>
+            </a:r>
+          </a:p>
+          <a:p>
+            <a:r>
+              <a:rPr lang="de-CH" sz="1000" dirty="0">
                 <a:solidFill>
                   <a:srgbClr val="212121"/>
                 </a:solidFill>
-                <a:effectLst/>
-                <a:latin typeface="Consolas" panose="020B0609020204030204" pitchFamily="49" charset="0"/>
-              </a:rPr>
-              <a:t>,</a:t>
-            </a:r>
-          </a:p>
-          <a:p>
-            <a:r>
-              <a:rPr lang="de-CH" sz="1100" b="0" dirty="0">
+                <a:latin typeface="Courier New" panose="02070309020205020404" pitchFamily="49" charset="0"/>
+                <a:cs typeface="Courier New" panose="02070309020205020404" pitchFamily="49" charset="0"/>
+              </a:rPr>
+              <a:t>    </a:t>
+            </a:r>
+            <a:r>
+              <a:rPr lang="de-CH" sz="1000" b="1" dirty="0">
                 <a:solidFill>
                   <a:srgbClr val="212121"/>
                 </a:solidFill>
-                <a:effectLst/>
-                <a:latin typeface="Consolas" panose="020B0609020204030204" pitchFamily="49" charset="0"/>
-              </a:rPr>
-              <a:t>    </a:t>
-            </a:r>
-            <a:r>
-              <a:rPr lang="de-CH" sz="1100" b="0" dirty="0">
-                <a:solidFill>
-                  <a:srgbClr val="A31515"/>
-                </a:solidFill>
-                <a:effectLst/>
-                <a:latin typeface="Consolas" panose="020B0609020204030204" pitchFamily="49" charset="0"/>
-              </a:rPr>
-              <a:t>"LoadedAt:2023-05-04T05:24:10.583"</a:t>
-            </a:r>
-            <a:r>
-              <a:rPr lang="de-CH" sz="1100" b="0" dirty="0">
+                <a:latin typeface="Courier New" panose="02070309020205020404" pitchFamily="49" charset="0"/>
+                <a:cs typeface="Courier New" panose="02070309020205020404" pitchFamily="49" charset="0"/>
+              </a:rPr>
+              <a:t>,"ExtentFingerprint:20211125"</a:t>
+            </a:r>
+            <a:r>
+              <a:rPr lang="de-CH" sz="1000" dirty="0">
                 <a:solidFill>
                   <a:srgbClr val="212121"/>
                 </a:solidFill>
-                <a:effectLst/>
-                <a:latin typeface="Consolas" panose="020B0609020204030204" pitchFamily="49" charset="0"/>
-              </a:rPr>
-              <a:t>,</a:t>
-            </a:r>
-          </a:p>
-          <a:p>
-            <a:r>
-              <a:rPr lang="de-CH" sz="1100" b="0" dirty="0">
-                <a:solidFill>
-                  <a:srgbClr val="212121"/>
-                </a:solidFill>
-                <a:effectLst/>
-                <a:latin typeface="Consolas" panose="020B0609020204030204" pitchFamily="49" charset="0"/>
-              </a:rPr>
-              <a:t>    </a:t>
-            </a:r>
-            <a:r>
-              <a:rPr lang="de-CH" sz="1100" b="0" dirty="0">
-                <a:solidFill>
-                  <a:srgbClr val="A31515"/>
-                </a:solidFill>
-                <a:effectLst/>
-                <a:latin typeface="Consolas" panose="020B0609020204030204" pitchFamily="49" charset="0"/>
-              </a:rPr>
-              <a:t>"SlicedImportObject_Id:6DD4A13A-…-BF79"</a:t>
-            </a:r>
-            <a:r>
-              <a:rPr lang="de-CH" sz="1100" b="0" dirty="0">
-                <a:solidFill>
-                  <a:srgbClr val="212121"/>
-                </a:solidFill>
-                <a:effectLst/>
-                <a:latin typeface="Consolas" panose="020B0609020204030204" pitchFamily="49" charset="0"/>
-              </a:rPr>
-              <a:t>]</a:t>
-            </a:r>
-          </a:p>
-          <a:p>
-            <a:r>
-              <a:rPr lang="de-CH" sz="1100" b="0" dirty="0">
-                <a:solidFill>
-                  <a:srgbClr val="212121"/>
-                </a:solidFill>
-                <a:effectLst/>
-                <a:latin typeface="Consolas" panose="020B0609020204030204" pitchFamily="49" charset="0"/>
-              </a:rPr>
-              <a:t>}</a:t>
+                <a:latin typeface="Courier New" panose="02070309020205020404" pitchFamily="49" charset="0"/>
+                <a:cs typeface="Courier New" panose="02070309020205020404" pitchFamily="49" charset="0"/>
+              </a:rPr>
+              <a:t>]}</a:t>
             </a:r>
           </a:p>
         </p:txBody>
       </p:sp>
       <p:sp>
         <p:nvSpPr>
-          <p:cNvPr id="6" name="Callout: Bent Line 5">
-            <a:extLst>
-              <a:ext uri="{FF2B5EF4-FFF2-40B4-BE49-F238E27FC236}">
-                <a16:creationId xmlns:a16="http://schemas.microsoft.com/office/drawing/2014/main" id="{F6A6DA95-46E3-5EEE-7337-1BC2B43381CF}"/>
+          <p:cNvPr id="16" name="Callout: Bent Line 15">
+            <a:extLst>
+              <a:ext uri="{FF2B5EF4-FFF2-40B4-BE49-F238E27FC236}">
+                <a16:creationId xmlns:a16="http://schemas.microsoft.com/office/drawing/2014/main" id="{C274CCE9-792B-99D9-A559-736926F135B7}"/>
               </a:ext>
             </a:extLst>
           </p:cNvPr>
@@ -12169,254 +12257,137 @@
           <a:bodyPr rtlCol="0" anchor="ctr"/>
           <a:lstStyle/>
           <a:p>
-            <a:r>
-              <a:rPr lang="de-CH" sz="1100" b="0" dirty="0">
+            <a:pPr lvl="0"/>
+            <a:r>
+              <a:rPr lang="de-CH" sz="1000" dirty="0">
                 <a:solidFill>
                   <a:srgbClr val="212121"/>
                 </a:solidFill>
-                <a:effectLst/>
-                <a:latin typeface="Consolas" panose="020B0609020204030204" pitchFamily="49" charset="0"/>
-              </a:rPr>
-              <a:t>{</a:t>
-            </a:r>
-            <a:r>
-              <a:rPr lang="de-CH" sz="1100" b="1" dirty="0">
-                <a:solidFill>
-                  <a:srgbClr val="0451A5"/>
-                </a:solidFill>
-                <a:effectLst/>
-                <a:latin typeface="Consolas" panose="020B0609020204030204" pitchFamily="49" charset="0"/>
-              </a:rPr>
-              <a:t>"</a:t>
-            </a:r>
-            <a:r>
-              <a:rPr lang="de-CH" sz="1100" b="1" dirty="0" err="1">
-                <a:solidFill>
-                  <a:srgbClr val="0451A5"/>
-                </a:solidFill>
-                <a:effectLst/>
-                <a:latin typeface="Consolas" panose="020B0609020204030204" pitchFamily="49" charset="0"/>
+                <a:latin typeface="Courier New" panose="02070309020205020404" pitchFamily="49" charset="0"/>
+                <a:cs typeface="Courier New" panose="02070309020205020404" pitchFamily="49" charset="0"/>
+              </a:rPr>
+              <a:t>{"</a:t>
+            </a:r>
+            <a:r>
+              <a:rPr lang="de-CH" sz="1000" b="1" dirty="0" err="1">
+                <a:solidFill>
+                  <a:srgbClr val="212121"/>
+                </a:solidFill>
+                <a:latin typeface="Courier New" panose="02070309020205020404" pitchFamily="49" charset="0"/>
+                <a:cs typeface="Courier New" panose="02070309020205020404" pitchFamily="49" charset="0"/>
               </a:rPr>
               <a:t>creationTime</a:t>
             </a:r>
             <a:r>
-              <a:rPr lang="de-CH" sz="1100" b="1" dirty="0">
-                <a:solidFill>
-                  <a:srgbClr val="0451A5"/>
-                </a:solidFill>
-                <a:effectLst/>
-                <a:latin typeface="Consolas" panose="020B0609020204030204" pitchFamily="49" charset="0"/>
-              </a:rPr>
-              <a:t>"</a:t>
-            </a:r>
-            <a:r>
-              <a:rPr lang="de-CH" sz="1100" b="1" dirty="0">
+              <a:rPr lang="de-CH" sz="1000" b="1" dirty="0">
                 <a:solidFill>
                   <a:srgbClr val="212121"/>
                 </a:solidFill>
-                <a:effectLst/>
-                <a:latin typeface="Consolas" panose="020B0609020204030204" pitchFamily="49" charset="0"/>
-              </a:rPr>
-              <a:t>: </a:t>
-            </a:r>
-            <a:r>
-              <a:rPr lang="de-CH" sz="1100" b="1" dirty="0">
-                <a:solidFill>
-                  <a:srgbClr val="A31515"/>
-                </a:solidFill>
-                <a:effectLst/>
-                <a:latin typeface="Consolas" panose="020B0609020204030204" pitchFamily="49" charset="0"/>
-              </a:rPr>
-              <a:t>"2021-11-26"</a:t>
-            </a:r>
-            <a:r>
-              <a:rPr lang="de-CH" sz="1100" b="0" dirty="0">
+                <a:latin typeface="Courier New" panose="02070309020205020404" pitchFamily="49" charset="0"/>
+                <a:cs typeface="Courier New" panose="02070309020205020404" pitchFamily="49" charset="0"/>
+              </a:rPr>
+              <a:t>": "2021-11-26"</a:t>
+            </a:r>
+          </a:p>
+          <a:p>
+            <a:pPr lvl="0"/>
+            <a:r>
+              <a:rPr lang="de-CH" sz="1000" dirty="0">
                 <a:solidFill>
                   <a:srgbClr val="212121"/>
                 </a:solidFill>
-                <a:effectLst/>
-                <a:latin typeface="Consolas" panose="020B0609020204030204" pitchFamily="49" charset="0"/>
-              </a:rPr>
-              <a:t>,</a:t>
-            </a:r>
-          </a:p>
-          <a:p>
-            <a:r>
-              <a:rPr lang="de-CH" sz="1100" b="0" dirty="0">
+                <a:latin typeface="Courier New" panose="02070309020205020404" pitchFamily="49" charset="0"/>
+                <a:cs typeface="Courier New" panose="02070309020205020404" pitchFamily="49" charset="0"/>
+              </a:rPr>
+              <a:t>  ,"tags":</a:t>
+            </a:r>
+            <a:br>
+              <a:rPr lang="de-CH" sz="1000" dirty="0">
                 <a:solidFill>
                   <a:srgbClr val="212121"/>
                 </a:solidFill>
-                <a:effectLst/>
-                <a:latin typeface="Consolas" panose="020B0609020204030204" pitchFamily="49" charset="0"/>
-              </a:rPr>
-              <a:t> </a:t>
-            </a:r>
-            <a:r>
-              <a:rPr lang="de-CH" sz="1100" b="0" dirty="0">
-                <a:solidFill>
-                  <a:srgbClr val="0451A5"/>
-                </a:solidFill>
-                <a:effectLst/>
-                <a:latin typeface="Consolas" panose="020B0609020204030204" pitchFamily="49" charset="0"/>
-              </a:rPr>
-              <a:t>"tags"</a:t>
-            </a:r>
-            <a:r>
-              <a:rPr lang="de-CH" sz="1100" b="0" dirty="0">
+                <a:latin typeface="Courier New" panose="02070309020205020404" pitchFamily="49" charset="0"/>
+                <a:cs typeface="Courier New" panose="02070309020205020404" pitchFamily="49" charset="0"/>
+              </a:rPr>
+            </a:br>
+            <a:r>
+              <a:rPr lang="de-CH" sz="1000" dirty="0">
                 <a:solidFill>
                   <a:srgbClr val="212121"/>
                 </a:solidFill>
-                <a:effectLst/>
-                <a:latin typeface="Consolas" panose="020B0609020204030204" pitchFamily="49" charset="0"/>
-              </a:rPr>
-              <a:t>: </a:t>
-            </a:r>
-          </a:p>
-          <a:p>
-            <a:r>
-              <a:rPr lang="de-CH" sz="1100" dirty="0">
+                <a:latin typeface="Courier New" panose="02070309020205020404" pitchFamily="49" charset="0"/>
+                <a:cs typeface="Courier New" panose="02070309020205020404" pitchFamily="49" charset="0"/>
+              </a:rPr>
+              <a:t>    ["LoadedAt:2023-05-12T07:51:32.343"</a:t>
+            </a:r>
+          </a:p>
+          <a:p>
+            <a:pPr lvl="0"/>
+            <a:r>
+              <a:rPr lang="de-CH" sz="1000" dirty="0">
                 <a:solidFill>
                   <a:srgbClr val="212121"/>
                 </a:solidFill>
-                <a:latin typeface="Consolas" panose="020B0609020204030204" pitchFamily="49" charset="0"/>
-              </a:rPr>
-              <a:t>   </a:t>
-            </a:r>
-            <a:r>
-              <a:rPr lang="de-CH" sz="1100" b="0" dirty="0">
+                <a:latin typeface="Courier New" panose="02070309020205020404" pitchFamily="49" charset="0"/>
+                <a:cs typeface="Courier New" panose="02070309020205020404" pitchFamily="49" charset="0"/>
+              </a:rPr>
+              <a:t>    ,"SlicedImportObject_Id:5FC9A0…A23E7F7"</a:t>
+            </a:r>
+          </a:p>
+          <a:p>
+            <a:pPr lvl="0"/>
+            <a:r>
+              <a:rPr lang="de-CH" sz="1000" dirty="0">
                 <a:solidFill>
                   <a:srgbClr val="212121"/>
                 </a:solidFill>
-                <a:effectLst/>
-                <a:latin typeface="Consolas" panose="020B0609020204030204" pitchFamily="49" charset="0"/>
-              </a:rPr>
-              <a:t>[</a:t>
-            </a:r>
-            <a:r>
-              <a:rPr lang="de-CH" sz="1100" b="0" dirty="0">
-                <a:solidFill>
-                  <a:srgbClr val="A31515"/>
-                </a:solidFill>
-                <a:effectLst/>
-                <a:latin typeface="Consolas" panose="020B0609020204030204" pitchFamily="49" charset="0"/>
-              </a:rPr>
-              <a:t>"</a:t>
-            </a:r>
-            <a:r>
-              <a:rPr lang="de-CH" sz="1100" b="0" dirty="0" err="1">
-                <a:solidFill>
-                  <a:srgbClr val="A31515"/>
-                </a:solidFill>
-                <a:effectLst/>
-                <a:latin typeface="Consolas" panose="020B0609020204030204" pitchFamily="49" charset="0"/>
-              </a:rPr>
-              <a:t>Source:PipelineLoad</a:t>
-            </a:r>
-            <a:r>
-              <a:rPr lang="de-CH" sz="1100" b="0" dirty="0">
-                <a:solidFill>
-                  <a:srgbClr val="A31515"/>
-                </a:solidFill>
-                <a:effectLst/>
-                <a:latin typeface="Consolas" panose="020B0609020204030204" pitchFamily="49" charset="0"/>
-              </a:rPr>
-              <a:t>"</a:t>
-            </a:r>
-            <a:r>
-              <a:rPr lang="de-CH" sz="1100" b="0" dirty="0">
+                <a:latin typeface="Courier New" panose="02070309020205020404" pitchFamily="49" charset="0"/>
+                <a:cs typeface="Courier New" panose="02070309020205020404" pitchFamily="49" charset="0"/>
+              </a:rPr>
+              <a:t>    ,"PipelineRun_Id:14d26153-99…710ca6d2"</a:t>
+            </a:r>
+          </a:p>
+          <a:p>
+            <a:pPr lvl="0"/>
+            <a:r>
+              <a:rPr lang="de-CH" sz="1000" dirty="0">
                 <a:solidFill>
                   <a:srgbClr val="212121"/>
                 </a:solidFill>
-                <a:effectLst/>
-                <a:latin typeface="Consolas" panose="020B0609020204030204" pitchFamily="49" charset="0"/>
-              </a:rPr>
-              <a:t>,</a:t>
-            </a:r>
-          </a:p>
-          <a:p>
-            <a:r>
-              <a:rPr lang="de-CH" sz="1100" b="0" dirty="0">
+                <a:latin typeface="Courier New" panose="02070309020205020404" pitchFamily="49" charset="0"/>
+                <a:cs typeface="Courier New" panose="02070309020205020404" pitchFamily="49" charset="0"/>
+              </a:rPr>
+              <a:t>    </a:t>
+            </a:r>
+            <a:r>
+              <a:rPr lang="de-CH" sz="1000" b="1" dirty="0">
                 <a:solidFill>
                   <a:srgbClr val="212121"/>
                 </a:solidFill>
-                <a:effectLst/>
-                <a:latin typeface="Consolas" panose="020B0609020204030204" pitchFamily="49" charset="0"/>
-              </a:rPr>
-              <a:t>    </a:t>
-            </a:r>
-            <a:r>
-              <a:rPr lang="de-CH" sz="1100" b="0" dirty="0">
-                <a:solidFill>
-                  <a:srgbClr val="A31515"/>
-                </a:solidFill>
-                <a:effectLst/>
-                <a:latin typeface="Consolas" panose="020B0609020204030204" pitchFamily="49" charset="0"/>
-              </a:rPr>
-              <a:t>"LoadedAt:2023-05-04T05:24:10.583"</a:t>
-            </a:r>
-            <a:r>
-              <a:rPr lang="de-CH" sz="1100" b="0" dirty="0">
+                <a:latin typeface="Courier New" panose="02070309020205020404" pitchFamily="49" charset="0"/>
+                <a:cs typeface="Courier New" panose="02070309020205020404" pitchFamily="49" charset="0"/>
+              </a:rPr>
+              <a:t>,"ExtentFingerprint:20211126"</a:t>
+            </a:r>
+            <a:r>
+              <a:rPr lang="de-CH" sz="1000" dirty="0">
                 <a:solidFill>
                   <a:srgbClr val="212121"/>
                 </a:solidFill>
-                <a:effectLst/>
-                <a:latin typeface="Consolas" panose="020B0609020204030204" pitchFamily="49" charset="0"/>
-              </a:rPr>
-              <a:t>,</a:t>
-            </a:r>
-          </a:p>
-          <a:p>
-            <a:r>
-              <a:rPr lang="de-CH" sz="1100" b="0" dirty="0">
-                <a:solidFill>
-                  <a:srgbClr val="212121"/>
-                </a:solidFill>
-                <a:effectLst/>
-                <a:latin typeface="Consolas" panose="020B0609020204030204" pitchFamily="49" charset="0"/>
-              </a:rPr>
-              <a:t>    </a:t>
-            </a:r>
-            <a:r>
-              <a:rPr lang="de-CH" sz="1100" b="0" dirty="0">
-                <a:solidFill>
-                  <a:srgbClr val="A31515"/>
-                </a:solidFill>
-                <a:effectLst/>
-                <a:latin typeface="Consolas" panose="020B0609020204030204" pitchFamily="49" charset="0"/>
-              </a:rPr>
-              <a:t>"SlicedImportObject_Id:6DD4A13A-…-BF79"</a:t>
-            </a:r>
-            <a:r>
-              <a:rPr lang="de-CH" sz="1100" b="0" dirty="0">
-                <a:solidFill>
-                  <a:srgbClr val="212121"/>
-                </a:solidFill>
-                <a:effectLst/>
-                <a:latin typeface="Consolas" panose="020B0609020204030204" pitchFamily="49" charset="0"/>
-              </a:rPr>
-              <a:t>]</a:t>
-            </a:r>
-          </a:p>
-          <a:p>
-            <a:r>
-              <a:rPr lang="de-CH" sz="1100" b="0" dirty="0">
-                <a:solidFill>
-                  <a:srgbClr val="212121"/>
-                </a:solidFill>
-                <a:effectLst/>
-                <a:latin typeface="Consolas" panose="020B0609020204030204" pitchFamily="49" charset="0"/>
-              </a:rPr>
-              <a:t>}</a:t>
+                <a:latin typeface="Courier New" panose="02070309020205020404" pitchFamily="49" charset="0"/>
+                <a:cs typeface="Courier New" panose="02070309020205020404" pitchFamily="49" charset="0"/>
+              </a:rPr>
+              <a:t>]}</a:t>
             </a:r>
           </a:p>
         </p:txBody>
       </p:sp>
       <p:sp>
         <p:nvSpPr>
-          <p:cNvPr id="7" name="Callout: Bent Line 6">
-            <a:extLst>
-              <a:ext uri="{FF2B5EF4-FFF2-40B4-BE49-F238E27FC236}">
-                <a16:creationId xmlns:a16="http://schemas.microsoft.com/office/drawing/2014/main" id="{C72919FE-3694-8961-0F0D-01ABBE4E73E4}"/>
+          <p:cNvPr id="20" name="Callout: Bent Line 19">
+            <a:extLst>
+              <a:ext uri="{FF2B5EF4-FFF2-40B4-BE49-F238E27FC236}">
+                <a16:creationId xmlns:a16="http://schemas.microsoft.com/office/drawing/2014/main" id="{159DB9F2-82FB-6E16-168E-2605797A601E}"/>
               </a:ext>
             </a:extLst>
           </p:cNvPr>
@@ -12473,331 +12444,131 @@
           <a:bodyPr rtlCol="0" anchor="ctr"/>
           <a:lstStyle/>
           <a:p>
-            <a:r>
-              <a:rPr lang="de-CH" sz="1100" dirty="0">
+            <a:pPr lvl="0"/>
+            <a:r>
+              <a:rPr lang="de-CH" sz="1000" dirty="0">
                 <a:solidFill>
                   <a:srgbClr val="212121"/>
                 </a:solidFill>
-                <a:effectLst/>
-                <a:latin typeface="Consolas" panose="020B0609020204030204" pitchFamily="49" charset="0"/>
-              </a:rPr>
-              <a:t>{</a:t>
-            </a:r>
-            <a:r>
-              <a:rPr lang="de-CH" sz="1100" b="1" dirty="0">
-                <a:solidFill>
-                  <a:srgbClr val="0451A5"/>
-                </a:solidFill>
-                <a:effectLst/>
-                <a:latin typeface="Consolas" panose="020B0609020204030204" pitchFamily="49" charset="0"/>
-              </a:rPr>
-              <a:t>"</a:t>
-            </a:r>
-            <a:r>
-              <a:rPr lang="de-CH" sz="1100" b="1" dirty="0" err="1">
-                <a:solidFill>
-                  <a:srgbClr val="0451A5"/>
-                </a:solidFill>
-                <a:effectLst/>
-                <a:latin typeface="Consolas" panose="020B0609020204030204" pitchFamily="49" charset="0"/>
+                <a:latin typeface="Courier New" panose="02070309020205020404" pitchFamily="49" charset="0"/>
+                <a:cs typeface="Courier New" panose="02070309020205020404" pitchFamily="49" charset="0"/>
+              </a:rPr>
+              <a:t>{"</a:t>
+            </a:r>
+            <a:r>
+              <a:rPr lang="de-CH" sz="1000" b="1" dirty="0" err="1">
+                <a:solidFill>
+                  <a:srgbClr val="212121"/>
+                </a:solidFill>
+                <a:latin typeface="Courier New" panose="02070309020205020404" pitchFamily="49" charset="0"/>
+                <a:cs typeface="Courier New" panose="02070309020205020404" pitchFamily="49" charset="0"/>
               </a:rPr>
               <a:t>creationTime</a:t>
             </a:r>
             <a:r>
-              <a:rPr lang="de-CH" sz="1100" b="1" dirty="0">
-                <a:solidFill>
-                  <a:srgbClr val="0451A5"/>
-                </a:solidFill>
-                <a:effectLst/>
-                <a:latin typeface="Consolas" panose="020B0609020204030204" pitchFamily="49" charset="0"/>
-              </a:rPr>
-              <a:t>"</a:t>
-            </a:r>
-            <a:r>
-              <a:rPr lang="de-CH" sz="1100" b="1" dirty="0">
+              <a:rPr lang="de-CH" sz="1000" b="1" dirty="0">
                 <a:solidFill>
                   <a:srgbClr val="212121"/>
                 </a:solidFill>
-                <a:effectLst/>
-                <a:latin typeface="Consolas" panose="020B0609020204030204" pitchFamily="49" charset="0"/>
-              </a:rPr>
-              <a:t>: </a:t>
-            </a:r>
-            <a:r>
-              <a:rPr lang="de-CH" sz="1100" b="1" dirty="0">
-                <a:solidFill>
-                  <a:srgbClr val="A31515"/>
-                </a:solidFill>
-                <a:effectLst/>
-                <a:latin typeface="Consolas" panose="020B0609020204030204" pitchFamily="49" charset="0"/>
-              </a:rPr>
-              <a:t>"2021-11-27"</a:t>
-            </a:r>
-            <a:r>
-              <a:rPr lang="de-CH" sz="1100" b="1" dirty="0">
+                <a:latin typeface="Courier New" panose="02070309020205020404" pitchFamily="49" charset="0"/>
+                <a:cs typeface="Courier New" panose="02070309020205020404" pitchFamily="49" charset="0"/>
+              </a:rPr>
+              <a:t>": "2021-11-27"</a:t>
+            </a:r>
+          </a:p>
+          <a:p>
+            <a:pPr lvl="0"/>
+            <a:r>
+              <a:rPr lang="de-CH" sz="1000" dirty="0">
                 <a:solidFill>
                   <a:srgbClr val="212121"/>
                 </a:solidFill>
-                <a:effectLst/>
-                <a:latin typeface="Consolas" panose="020B0609020204030204" pitchFamily="49" charset="0"/>
-              </a:rPr>
-              <a:t>,</a:t>
-            </a:r>
-          </a:p>
-          <a:p>
-            <a:r>
-              <a:rPr lang="de-CH" sz="1100" b="0" dirty="0">
+                <a:latin typeface="Courier New" panose="02070309020205020404" pitchFamily="49" charset="0"/>
+                <a:cs typeface="Courier New" panose="02070309020205020404" pitchFamily="49" charset="0"/>
+              </a:rPr>
+              <a:t>  ,"tags":</a:t>
+            </a:r>
+            <a:br>
+              <a:rPr lang="de-CH" sz="1000" dirty="0">
                 <a:solidFill>
                   <a:srgbClr val="212121"/>
                 </a:solidFill>
-                <a:effectLst/>
-                <a:latin typeface="Consolas" panose="020B0609020204030204" pitchFamily="49" charset="0"/>
-              </a:rPr>
-              <a:t> </a:t>
-            </a:r>
-            <a:r>
-              <a:rPr lang="de-CH" sz="1100" b="0" dirty="0">
-                <a:solidFill>
-                  <a:srgbClr val="0451A5"/>
-                </a:solidFill>
-                <a:effectLst/>
-                <a:latin typeface="Consolas" panose="020B0609020204030204" pitchFamily="49" charset="0"/>
-              </a:rPr>
-              <a:t>"tags"</a:t>
-            </a:r>
-            <a:r>
-              <a:rPr lang="de-CH" sz="1100" b="0" dirty="0">
+                <a:latin typeface="Courier New" panose="02070309020205020404" pitchFamily="49" charset="0"/>
+                <a:cs typeface="Courier New" panose="02070309020205020404" pitchFamily="49" charset="0"/>
+              </a:rPr>
+            </a:br>
+            <a:r>
+              <a:rPr lang="de-CH" sz="1000" dirty="0">
                 <a:solidFill>
                   <a:srgbClr val="212121"/>
                 </a:solidFill>
-                <a:effectLst/>
-                <a:latin typeface="Consolas" panose="020B0609020204030204" pitchFamily="49" charset="0"/>
-              </a:rPr>
-              <a:t>: </a:t>
-            </a:r>
-          </a:p>
-          <a:p>
-            <a:r>
-              <a:rPr lang="de-CH" sz="1100" dirty="0">
+                <a:latin typeface="Courier New" panose="02070309020205020404" pitchFamily="49" charset="0"/>
+                <a:cs typeface="Courier New" panose="02070309020205020404" pitchFamily="49" charset="0"/>
+              </a:rPr>
+              <a:t>    ["LoadedAt:2023-05-12T07:51:32.343"</a:t>
+            </a:r>
+          </a:p>
+          <a:p>
+            <a:pPr lvl="0"/>
+            <a:r>
+              <a:rPr lang="de-CH" sz="1000" dirty="0">
                 <a:solidFill>
                   <a:srgbClr val="212121"/>
                 </a:solidFill>
-                <a:latin typeface="Consolas" panose="020B0609020204030204" pitchFamily="49" charset="0"/>
-              </a:rPr>
-              <a:t>   </a:t>
-            </a:r>
-            <a:r>
-              <a:rPr lang="de-CH" sz="1100" b="0" dirty="0">
+                <a:latin typeface="Courier New" panose="02070309020205020404" pitchFamily="49" charset="0"/>
+                <a:cs typeface="Courier New" panose="02070309020205020404" pitchFamily="49" charset="0"/>
+              </a:rPr>
+              <a:t>    ,"SlicedImportObject_Id:6FC9A0…A23E7F7"</a:t>
+            </a:r>
+          </a:p>
+          <a:p>
+            <a:pPr lvl="0"/>
+            <a:r>
+              <a:rPr lang="de-CH" sz="1000" dirty="0">
                 <a:solidFill>
                   <a:srgbClr val="212121"/>
                 </a:solidFill>
-                <a:effectLst/>
-                <a:latin typeface="Consolas" panose="020B0609020204030204" pitchFamily="49" charset="0"/>
-              </a:rPr>
-              <a:t>[</a:t>
-            </a:r>
-            <a:r>
-              <a:rPr lang="de-CH" sz="1100" b="0" dirty="0">
-                <a:solidFill>
-                  <a:srgbClr val="A31515"/>
-                </a:solidFill>
-                <a:effectLst/>
-                <a:latin typeface="Consolas" panose="020B0609020204030204" pitchFamily="49" charset="0"/>
-              </a:rPr>
-              <a:t>"</a:t>
-            </a:r>
-            <a:r>
-              <a:rPr lang="de-CH" sz="1100" b="0" dirty="0" err="1">
-                <a:solidFill>
-                  <a:srgbClr val="A31515"/>
-                </a:solidFill>
-                <a:effectLst/>
-                <a:latin typeface="Consolas" panose="020B0609020204030204" pitchFamily="49" charset="0"/>
-              </a:rPr>
-              <a:t>Source:PipelineLoad</a:t>
-            </a:r>
-            <a:r>
-              <a:rPr lang="de-CH" sz="1100" b="0" dirty="0">
-                <a:solidFill>
-                  <a:srgbClr val="A31515"/>
-                </a:solidFill>
-                <a:effectLst/>
-                <a:latin typeface="Consolas" panose="020B0609020204030204" pitchFamily="49" charset="0"/>
-              </a:rPr>
-              <a:t>"</a:t>
-            </a:r>
-            <a:r>
-              <a:rPr lang="de-CH" sz="1100" b="0" dirty="0">
+                <a:latin typeface="Courier New" panose="02070309020205020404" pitchFamily="49" charset="0"/>
+                <a:cs typeface="Courier New" panose="02070309020205020404" pitchFamily="49" charset="0"/>
+              </a:rPr>
+              <a:t>    ,"PipelineRun_Id:34d26153-99…710ca6d2"</a:t>
+            </a:r>
+          </a:p>
+          <a:p>
+            <a:pPr lvl="0"/>
+            <a:r>
+              <a:rPr lang="de-CH" sz="1000" dirty="0">
                 <a:solidFill>
                   <a:srgbClr val="212121"/>
                 </a:solidFill>
-                <a:effectLst/>
-                <a:latin typeface="Consolas" panose="020B0609020204030204" pitchFamily="49" charset="0"/>
-              </a:rPr>
-              <a:t>,</a:t>
-            </a:r>
-          </a:p>
-          <a:p>
-            <a:r>
-              <a:rPr lang="de-CH" sz="1100" b="0" dirty="0">
+                <a:latin typeface="Courier New" panose="02070309020205020404" pitchFamily="49" charset="0"/>
+                <a:cs typeface="Courier New" panose="02070309020205020404" pitchFamily="49" charset="0"/>
+              </a:rPr>
+              <a:t>    </a:t>
+            </a:r>
+            <a:r>
+              <a:rPr lang="de-CH" sz="1000" b="1" dirty="0">
                 <a:solidFill>
                   <a:srgbClr val="212121"/>
                 </a:solidFill>
-                <a:effectLst/>
-                <a:latin typeface="Consolas" panose="020B0609020204030204" pitchFamily="49" charset="0"/>
-              </a:rPr>
-              <a:t>    </a:t>
-            </a:r>
-            <a:r>
-              <a:rPr lang="de-CH" sz="1100" b="0" dirty="0">
-                <a:solidFill>
-                  <a:srgbClr val="A31515"/>
-                </a:solidFill>
-                <a:effectLst/>
-                <a:latin typeface="Consolas" panose="020B0609020204030204" pitchFamily="49" charset="0"/>
-              </a:rPr>
-              <a:t>"LoadedAt:2023-05-04T05:24:10.583"</a:t>
-            </a:r>
-            <a:r>
-              <a:rPr lang="de-CH" sz="1100" b="0" dirty="0">
+                <a:latin typeface="Courier New" panose="02070309020205020404" pitchFamily="49" charset="0"/>
+                <a:cs typeface="Courier New" panose="02070309020205020404" pitchFamily="49" charset="0"/>
+              </a:rPr>
+              <a:t>,"ExtentFingerprint:20211127"</a:t>
+            </a:r>
+            <a:r>
+              <a:rPr lang="de-CH" sz="1000" dirty="0">
                 <a:solidFill>
                   <a:srgbClr val="212121"/>
                 </a:solidFill>
-                <a:effectLst/>
-                <a:latin typeface="Consolas" panose="020B0609020204030204" pitchFamily="49" charset="0"/>
-              </a:rPr>
-              <a:t>,</a:t>
-            </a:r>
-          </a:p>
-          <a:p>
-            <a:r>
-              <a:rPr lang="de-CH" sz="1100" b="0" dirty="0">
-                <a:solidFill>
-                  <a:srgbClr val="212121"/>
-                </a:solidFill>
-                <a:effectLst/>
-                <a:latin typeface="Consolas" panose="020B0609020204030204" pitchFamily="49" charset="0"/>
-              </a:rPr>
-              <a:t>    </a:t>
-            </a:r>
-            <a:r>
-              <a:rPr lang="de-CH" sz="1100" b="0" dirty="0">
-                <a:solidFill>
-                  <a:srgbClr val="A31515"/>
-                </a:solidFill>
-                <a:effectLst/>
-                <a:latin typeface="Consolas" panose="020B0609020204030204" pitchFamily="49" charset="0"/>
-              </a:rPr>
-              <a:t>"SlicedImportObject_Id:6DD4A13A-…-BF79"</a:t>
-            </a:r>
-            <a:r>
-              <a:rPr lang="de-CH" sz="1100" b="0" dirty="0">
-                <a:solidFill>
-                  <a:srgbClr val="212121"/>
-                </a:solidFill>
-                <a:effectLst/>
-                <a:latin typeface="Consolas" panose="020B0609020204030204" pitchFamily="49" charset="0"/>
-              </a:rPr>
-              <a:t>]</a:t>
-            </a:r>
-          </a:p>
-          <a:p>
-            <a:r>
-              <a:rPr lang="de-CH" sz="1100" b="0" dirty="0">
-                <a:solidFill>
-                  <a:srgbClr val="212121"/>
-                </a:solidFill>
-                <a:effectLst/>
-                <a:latin typeface="Consolas" panose="020B0609020204030204" pitchFamily="49" charset="0"/>
-              </a:rPr>
-              <a:t>}</a:t>
+                <a:latin typeface="Courier New" panose="02070309020205020404" pitchFamily="49" charset="0"/>
+                <a:cs typeface="Courier New" panose="02070309020205020404" pitchFamily="49" charset="0"/>
+              </a:rPr>
+              <a:t>]}</a:t>
             </a:r>
           </a:p>
         </p:txBody>
       </p:sp>
-      <p:pic>
-        <p:nvPicPr>
-          <p:cNvPr id="4" name="Picture 6" descr="Azure Data Lake Storage Connector - Mule 4">
-            <a:extLst>
-              <a:ext uri="{FF2B5EF4-FFF2-40B4-BE49-F238E27FC236}">
-                <a16:creationId xmlns:a16="http://schemas.microsoft.com/office/drawing/2014/main" id="{C2FD712E-F9E7-5ED9-C701-483117D29BBA}"/>
-              </a:ext>
-            </a:extLst>
-          </p:cNvPr>
-          <p:cNvPicPr>
-            <a:picLocks noChangeAspect="1" noChangeArrowheads="1"/>
-          </p:cNvPicPr>
-          <p:nvPr/>
-        </p:nvPicPr>
-        <p:blipFill rotWithShape="1">
-          <a:blip r:embed="rId10">
-            <a:extLst>
-              <a:ext uri="{28A0092B-C50C-407E-A947-70E740481C1C}">
-                <a14:useLocalDpi xmlns:a14="http://schemas.microsoft.com/office/drawing/2010/main" val="0"/>
-              </a:ext>
-            </a:extLst>
-          </a:blip>
-          <a:srcRect l="8924" r="9672"/>
-          <a:stretch/>
-        </p:blipFill>
-        <p:spPr bwMode="auto">
-          <a:xfrm>
-            <a:off x="5329229" y="2187529"/>
-            <a:ext cx="772404" cy="1048629"/>
-          </a:xfrm>
-          <a:prstGeom prst="rect">
-            <a:avLst/>
-          </a:prstGeom>
-          <a:noFill/>
-          <a:extLst>
-            <a:ext uri="{909E8E84-426E-40DD-AFC4-6F175D3DCCD1}">
-              <a14:hiddenFill xmlns:a14="http://schemas.microsoft.com/office/drawing/2010/main">
-                <a:solidFill>
-                  <a:srgbClr val="FFFFFF"/>
-                </a:solidFill>
-              </a14:hiddenFill>
-            </a:ext>
-          </a:extLst>
-        </p:spPr>
-      </p:pic>
-      <p:pic>
-        <p:nvPicPr>
-          <p:cNvPr id="5" name="Picture 4">
-            <a:extLst>
-              <a:ext uri="{FF2B5EF4-FFF2-40B4-BE49-F238E27FC236}">
-                <a16:creationId xmlns:a16="http://schemas.microsoft.com/office/drawing/2014/main" id="{92B2C62E-D9C0-5193-A51F-71D4CDA59BCD}"/>
-              </a:ext>
-            </a:extLst>
-          </p:cNvPr>
-          <p:cNvPicPr>
-            <a:picLocks noChangeAspect="1"/>
-          </p:cNvPicPr>
-          <p:nvPr/>
-        </p:nvPicPr>
-        <p:blipFill>
-          <a:blip r:embed="rId11"/>
-          <a:stretch>
-            <a:fillRect/>
-          </a:stretch>
-        </p:blipFill>
-        <p:spPr>
-          <a:xfrm>
-            <a:off x="4148699" y="3066881"/>
-            <a:ext cx="2219341" cy="2781320"/>
-          </a:xfrm>
-          <a:prstGeom prst="rect">
-            <a:avLst/>
-          </a:prstGeom>
-          <a:ln>
-            <a:solidFill>
-              <a:schemeClr val="tx1">
-                <a:lumMod val="50000"/>
-                <a:lumOff val="50000"/>
-              </a:schemeClr>
-            </a:solidFill>
-          </a:ln>
-        </p:spPr>
-      </p:pic>
       <p:pic>
         <p:nvPicPr>
           <p:cNvPr id="9" name="Picture 8">
@@ -12874,54 +12645,6 @@
           </a:ln>
         </p:spPr>
       </p:pic>
-      <p:cxnSp>
-        <p:nvCxnSpPr>
-          <p:cNvPr id="11" name="Straight Arrow Connector 10">
-            <a:extLst>
-              <a:ext uri="{FF2B5EF4-FFF2-40B4-BE49-F238E27FC236}">
-                <a16:creationId xmlns:a16="http://schemas.microsoft.com/office/drawing/2014/main" id="{32BA13E2-700C-39F2-1E77-403811AE3AE0}"/>
-              </a:ext>
-            </a:extLst>
-          </p:cNvPr>
-          <p:cNvCxnSpPr>
-            <a:cxnSpLocks/>
-            <a:endCxn id="9" idx="1"/>
-          </p:cNvCxnSpPr>
-          <p:nvPr/>
-        </p:nvCxnSpPr>
-        <p:spPr>
-          <a:xfrm>
-            <a:off x="5303325" y="5672145"/>
-            <a:ext cx="386305" cy="225235"/>
-          </a:xfrm>
-          <a:prstGeom prst="straightConnector1">
-            <a:avLst/>
-          </a:prstGeom>
-          <a:ln>
-            <a:solidFill>
-              <a:schemeClr val="tx1">
-                <a:lumMod val="85000"/>
-                <a:lumOff val="15000"/>
-              </a:schemeClr>
-            </a:solidFill>
-            <a:tailEnd type="triangle"/>
-          </a:ln>
-        </p:spPr>
-        <p:style>
-          <a:lnRef idx="1">
-            <a:schemeClr val="accent1"/>
-          </a:lnRef>
-          <a:fillRef idx="0">
-            <a:schemeClr val="accent1"/>
-          </a:fillRef>
-          <a:effectRef idx="0">
-            <a:schemeClr val="accent1"/>
-          </a:effectRef>
-          <a:fontRef idx="minor">
-            <a:schemeClr val="tx1"/>
-          </a:fontRef>
-        </p:style>
-      </p:cxnSp>
       <p:pic>
         <p:nvPicPr>
           <p:cNvPr id="17" name="Picture 16">
@@ -12960,101 +12683,6 @@
           </a:ln>
         </p:spPr>
       </p:pic>
-      <p:cxnSp>
-        <p:nvCxnSpPr>
-          <p:cNvPr id="18" name="Straight Arrow Connector 17">
-            <a:extLst>
-              <a:ext uri="{FF2B5EF4-FFF2-40B4-BE49-F238E27FC236}">
-                <a16:creationId xmlns:a16="http://schemas.microsoft.com/office/drawing/2014/main" id="{AD6D0765-0D72-5446-8F3F-CD198A33CA6C}"/>
-              </a:ext>
-            </a:extLst>
-          </p:cNvPr>
-          <p:cNvCxnSpPr>
-            <a:cxnSpLocks/>
-            <a:endCxn id="10" idx="1"/>
-          </p:cNvCxnSpPr>
-          <p:nvPr/>
-        </p:nvCxnSpPr>
-        <p:spPr>
-          <a:xfrm flipV="1">
-            <a:off x="5329229" y="5088152"/>
-            <a:ext cx="379452" cy="251117"/>
-          </a:xfrm>
-          <a:prstGeom prst="straightConnector1">
-            <a:avLst/>
-          </a:prstGeom>
-          <a:ln>
-            <a:solidFill>
-              <a:schemeClr val="tx1">
-                <a:lumMod val="85000"/>
-                <a:lumOff val="15000"/>
-              </a:schemeClr>
-            </a:solidFill>
-            <a:tailEnd type="triangle"/>
-          </a:ln>
-        </p:spPr>
-        <p:style>
-          <a:lnRef idx="1">
-            <a:schemeClr val="accent1"/>
-          </a:lnRef>
-          <a:fillRef idx="0">
-            <a:schemeClr val="accent1"/>
-          </a:fillRef>
-          <a:effectRef idx="0">
-            <a:schemeClr val="accent1"/>
-          </a:effectRef>
-          <a:fontRef idx="minor">
-            <a:schemeClr val="tx1"/>
-          </a:fontRef>
-        </p:style>
-      </p:cxnSp>
-      <p:cxnSp>
-        <p:nvCxnSpPr>
-          <p:cNvPr id="19" name="Straight Arrow Connector 18">
-            <a:extLst>
-              <a:ext uri="{FF2B5EF4-FFF2-40B4-BE49-F238E27FC236}">
-                <a16:creationId xmlns:a16="http://schemas.microsoft.com/office/drawing/2014/main" id="{8ED55D3A-1377-27FE-7398-A2B431E258E2}"/>
-              </a:ext>
-            </a:extLst>
-          </p:cNvPr>
-          <p:cNvCxnSpPr>
-            <a:cxnSpLocks/>
-          </p:cNvCxnSpPr>
-          <p:nvPr/>
-        </p:nvCxnSpPr>
-        <p:spPr>
-          <a:xfrm flipV="1">
-            <a:off x="5303325" y="4285365"/>
-            <a:ext cx="386305" cy="753608"/>
-          </a:xfrm>
-          <a:prstGeom prst="straightConnector1">
-            <a:avLst/>
-          </a:prstGeom>
-          <a:ln>
-            <a:solidFill>
-              <a:schemeClr val="tx1">
-                <a:lumMod val="85000"/>
-                <a:lumOff val="15000"/>
-              </a:schemeClr>
-            </a:solidFill>
-            <a:tailEnd type="triangle"/>
-          </a:ln>
-        </p:spPr>
-        <p:style>
-          <a:lnRef idx="1">
-            <a:schemeClr val="accent1"/>
-          </a:lnRef>
-          <a:fillRef idx="0">
-            <a:schemeClr val="accent1"/>
-          </a:fillRef>
-          <a:effectRef idx="0">
-            <a:schemeClr val="accent1"/>
-          </a:effectRef>
-          <a:fontRef idx="minor">
-            <a:schemeClr val="tx1"/>
-          </a:fontRef>
-        </p:style>
-      </p:cxnSp>
     </p:spTree>
     <p:extLst>
       <p:ext uri="{BB962C8B-B14F-4D97-AF65-F5344CB8AC3E}">
@@ -13099,7 +12727,7 @@
                                           </p:stCondLst>
                                         </p:cTn>
                                         <p:tgtEl>
-                                          <p:spTgt spid="3"/>
+                                          <p:spTgt spid="8"/>
                                         </p:tgtEl>
                                         <p:attrNameLst>
                                           <p:attrName>style.visibility</p:attrName>
@@ -13126,7 +12754,7 @@
                                           </p:stCondLst>
                                         </p:cTn>
                                         <p:tgtEl>
-                                          <p:spTgt spid="6"/>
+                                          <p:spTgt spid="16"/>
                                         </p:tgtEl>
                                         <p:attrNameLst>
                                           <p:attrName>style.visibility</p:attrName>
@@ -13153,7 +12781,7 @@
                                           </p:stCondLst>
                                         </p:cTn>
                                         <p:tgtEl>
-                                          <p:spTgt spid="7"/>
+                                          <p:spTgt spid="20"/>
                                         </p:tgtEl>
                                         <p:attrNameLst>
                                           <p:attrName>style.visibility</p:attrName>
@@ -13194,9 +12822,9 @@
       </p:par>
     </p:tnLst>
     <p:bldLst>
-      <p:bldP spid="3" grpId="0" animBg="1"/>
-      <p:bldP spid="6" grpId="0" animBg="1"/>
-      <p:bldP spid="7" grpId="0" animBg="1"/>
+      <p:bldP spid="8" grpId="0" animBg="1"/>
+      <p:bldP spid="16" grpId="0" animBg="1"/>
+      <p:bldP spid="20" grpId="0" animBg="1"/>
     </p:bldLst>
   </p:timing>
 </p:sld>
@@ -14916,6 +14544,188 @@
           </a:p>
         </p:txBody>
       </p:sp>
+      <p:sp>
+        <p:nvSpPr>
+          <p:cNvPr id="6" name="Callout: Bent Line 5">
+            <a:extLst>
+              <a:ext uri="{FF2B5EF4-FFF2-40B4-BE49-F238E27FC236}">
+                <a16:creationId xmlns:a16="http://schemas.microsoft.com/office/drawing/2014/main" id="{F5ADE905-58AC-731E-1B82-507E1458FB4F}"/>
+              </a:ext>
+            </a:extLst>
+          </p:cNvPr>
+          <p:cNvSpPr/>
+          <p:nvPr/>
+        </p:nvSpPr>
+        <p:spPr>
+          <a:xfrm>
+            <a:off x="8421408" y="443647"/>
+            <a:ext cx="3573125" cy="1085462"/>
+          </a:xfrm>
+          <a:prstGeom prst="borderCallout2">
+            <a:avLst>
+              <a:gd name="adj1" fmla="val 18750"/>
+              <a:gd name="adj2" fmla="val -1599"/>
+              <a:gd name="adj3" fmla="val 18750"/>
+              <a:gd name="adj4" fmla="val -16667"/>
+              <a:gd name="adj5" fmla="val 51537"/>
+              <a:gd name="adj6" fmla="val -26127"/>
+            </a:avLst>
+          </a:prstGeom>
+          <a:solidFill>
+            <a:schemeClr val="accent6">
+              <a:lumMod val="40000"/>
+              <a:lumOff val="60000"/>
+            </a:schemeClr>
+          </a:solidFill>
+          <a:ln>
+            <a:solidFill>
+              <a:schemeClr val="accent6">
+                <a:lumMod val="20000"/>
+                <a:lumOff val="80000"/>
+              </a:schemeClr>
+            </a:solidFill>
+          </a:ln>
+        </p:spPr>
+        <p:style>
+          <a:lnRef idx="2">
+            <a:schemeClr val="accent1">
+              <a:shade val="50000"/>
+            </a:schemeClr>
+          </a:lnRef>
+          <a:fillRef idx="1">
+            <a:schemeClr val="accent1"/>
+          </a:fillRef>
+          <a:effectRef idx="0">
+            <a:schemeClr val="accent1"/>
+          </a:effectRef>
+          <a:fontRef idx="minor">
+            <a:schemeClr val="lt1"/>
+          </a:fontRef>
+        </p:style>
+        <p:txBody>
+          <a:bodyPr rtlCol="0" anchor="ctr"/>
+          <a:lstStyle/>
+          <a:p>
+            <a:r>
+              <a:rPr lang="de-CH" sz="1000" dirty="0">
+                <a:solidFill>
+                  <a:srgbClr val="212121"/>
+                </a:solidFill>
+                <a:latin typeface="Courier New" panose="02070309020205020404" pitchFamily="49" charset="0"/>
+                <a:cs typeface="Courier New" panose="02070309020205020404" pitchFamily="49" charset="0"/>
+              </a:rPr>
+              <a:t>{"</a:t>
+            </a:r>
+            <a:r>
+              <a:rPr lang="de-CH" sz="1000" b="1" dirty="0" err="1">
+                <a:solidFill>
+                  <a:srgbClr val="212121"/>
+                </a:solidFill>
+                <a:latin typeface="Courier New" panose="02070309020205020404" pitchFamily="49" charset="0"/>
+                <a:cs typeface="Courier New" panose="02070309020205020404" pitchFamily="49" charset="0"/>
+              </a:rPr>
+              <a:t>creationTime</a:t>
+            </a:r>
+            <a:r>
+              <a:rPr lang="de-CH" sz="1000" b="1" dirty="0">
+                <a:solidFill>
+                  <a:srgbClr val="212121"/>
+                </a:solidFill>
+                <a:latin typeface="Courier New" panose="02070309020205020404" pitchFamily="49" charset="0"/>
+                <a:cs typeface="Courier New" panose="02070309020205020404" pitchFamily="49" charset="0"/>
+              </a:rPr>
+              <a:t>": "2021-11-25"</a:t>
+            </a:r>
+          </a:p>
+          <a:p>
+            <a:r>
+              <a:rPr lang="de-CH" sz="1000" dirty="0">
+                <a:solidFill>
+                  <a:srgbClr val="212121"/>
+                </a:solidFill>
+                <a:latin typeface="Courier New" panose="02070309020205020404" pitchFamily="49" charset="0"/>
+                <a:cs typeface="Courier New" panose="02070309020205020404" pitchFamily="49" charset="0"/>
+              </a:rPr>
+              <a:t>  ,"tags":</a:t>
+            </a:r>
+            <a:br>
+              <a:rPr lang="de-CH" sz="1000" dirty="0">
+                <a:solidFill>
+                  <a:srgbClr val="212121"/>
+                </a:solidFill>
+                <a:latin typeface="Courier New" panose="02070309020205020404" pitchFamily="49" charset="0"/>
+                <a:cs typeface="Courier New" panose="02070309020205020404" pitchFamily="49" charset="0"/>
+              </a:rPr>
+            </a:br>
+            <a:r>
+              <a:rPr lang="de-CH" sz="1000" dirty="0">
+                <a:solidFill>
+                  <a:srgbClr val="212121"/>
+                </a:solidFill>
+                <a:latin typeface="Courier New" panose="02070309020205020404" pitchFamily="49" charset="0"/>
+                <a:cs typeface="Courier New" panose="02070309020205020404" pitchFamily="49" charset="0"/>
+              </a:rPr>
+              <a:t>    ["LoadedAt:2023-05-12T07:51:32.343"</a:t>
+            </a:r>
+          </a:p>
+          <a:p>
+            <a:r>
+              <a:rPr lang="de-CH" sz="1000" dirty="0">
+                <a:solidFill>
+                  <a:srgbClr val="212121"/>
+                </a:solidFill>
+                <a:latin typeface="Courier New" panose="02070309020205020404" pitchFamily="49" charset="0"/>
+                <a:cs typeface="Courier New" panose="02070309020205020404" pitchFamily="49" charset="0"/>
+              </a:rPr>
+              <a:t>    ,"SlicedImportObject_Id:4FC9A0…A23E7F7"</a:t>
+            </a:r>
+          </a:p>
+          <a:p>
+            <a:r>
+              <a:rPr lang="de-CH" sz="1000" dirty="0">
+                <a:solidFill>
+                  <a:srgbClr val="212121"/>
+                </a:solidFill>
+                <a:latin typeface="Courier New" panose="02070309020205020404" pitchFamily="49" charset="0"/>
+                <a:cs typeface="Courier New" panose="02070309020205020404" pitchFamily="49" charset="0"/>
+              </a:rPr>
+              <a:t>    ,"PipelineRun_Id:04d26153-99…710ca6d2"</a:t>
+            </a:r>
+          </a:p>
+          <a:p>
+            <a:r>
+              <a:rPr lang="de-CH" sz="1000" dirty="0">
+                <a:solidFill>
+                  <a:srgbClr val="212121"/>
+                </a:solidFill>
+                <a:latin typeface="Courier New" panose="02070309020205020404" pitchFamily="49" charset="0"/>
+                <a:cs typeface="Courier New" panose="02070309020205020404" pitchFamily="49" charset="0"/>
+              </a:rPr>
+              <a:t>    </a:t>
+            </a:r>
+            <a:r>
+              <a:rPr lang="de-CH" sz="1000" b="1" dirty="0">
+                <a:solidFill>
+                  <a:srgbClr val="212121"/>
+                </a:solidFill>
+                <a:latin typeface="Courier New" panose="02070309020205020404" pitchFamily="49" charset="0"/>
+                <a:cs typeface="Courier New" panose="02070309020205020404" pitchFamily="49" charset="0"/>
+              </a:rPr>
+              <a:t>,"ExtentFingerprint:20211125"</a:t>
+            </a:r>
+            <a:r>
+              <a:rPr lang="de-CH" sz="1000" dirty="0">
+                <a:solidFill>
+                  <a:srgbClr val="212121"/>
+                </a:solidFill>
+                <a:latin typeface="Courier New" panose="02070309020205020404" pitchFamily="49" charset="0"/>
+                <a:cs typeface="Courier New" panose="02070309020205020404" pitchFamily="49" charset="0"/>
+              </a:rPr>
+              <a:t>]}</a:t>
+            </a:r>
+          </a:p>
+        </p:txBody>
+      </p:sp>
     </p:spTree>
     <p:extLst>
       <p:ext uri="{BB962C8B-B14F-4D97-AF65-F5344CB8AC3E}">
@@ -14979,6 +14789,51 @@
                       </p:childTnLst>
                     </p:cTn>
                   </p:par>
+                  <p:par>
+                    <p:cTn id="7" fill="hold">
+                      <p:stCondLst>
+                        <p:cond delay="indefinite"/>
+                      </p:stCondLst>
+                      <p:childTnLst>
+                        <p:par>
+                          <p:cTn id="8" fill="hold">
+                            <p:stCondLst>
+                              <p:cond delay="0"/>
+                            </p:stCondLst>
+                            <p:childTnLst>
+                              <p:par>
+                                <p:cTn id="9" presetID="1" presetClass="entr" presetSubtype="0" fill="hold" grpId="0" nodeType="clickEffect">
+                                  <p:stCondLst>
+                                    <p:cond delay="0"/>
+                                  </p:stCondLst>
+                                  <p:childTnLst>
+                                    <p:set>
+                                      <p:cBhvr>
+                                        <p:cTn id="10" dur="1" fill="hold">
+                                          <p:stCondLst>
+                                            <p:cond delay="0"/>
+                                          </p:stCondLst>
+                                        </p:cTn>
+                                        <p:tgtEl>
+                                          <p:spTgt spid="6"/>
+                                        </p:tgtEl>
+                                        <p:attrNameLst>
+                                          <p:attrName>style.visibility</p:attrName>
+                                        </p:attrNameLst>
+                                      </p:cBhvr>
+                                      <p:to>
+                                        <p:strVal val="visible"/>
+                                      </p:to>
+                                    </p:set>
+                                  </p:childTnLst>
+                                </p:cTn>
+                              </p:par>
+                            </p:childTnLst>
+                          </p:cTn>
+                        </p:par>
+                      </p:childTnLst>
+                    </p:cTn>
+                  </p:par>
                 </p:childTnLst>
               </p:cTn>
               <p:prevCondLst>
@@ -15002,6 +14857,7 @@
     </p:tnLst>
     <p:bldLst>
       <p:bldP spid="5" grpId="0" animBg="1"/>
+      <p:bldP spid="6" grpId="0" animBg="1"/>
     </p:bldLst>
   </p:timing>
 </p:sld>
@@ -37869,243 +37725,121 @@
           <a:lstStyle/>
           <a:p>
             <a:r>
-              <a:rPr lang="de-CH" sz="1100" b="0" dirty="0">
+              <a:rPr lang="de-CH" sz="1000" dirty="0">
                 <a:solidFill>
                   <a:srgbClr val="212121"/>
                 </a:solidFill>
-                <a:effectLst/>
-                <a:latin typeface="Consolas" panose="020B0609020204030204" pitchFamily="49" charset="0"/>
-              </a:rPr>
-              <a:t>{</a:t>
-            </a:r>
-            <a:r>
-              <a:rPr lang="de-CH" sz="1100" b="1" dirty="0">
-                <a:solidFill>
-                  <a:srgbClr val="0451A5"/>
-                </a:solidFill>
-                <a:effectLst/>
-                <a:latin typeface="Consolas" panose="020B0609020204030204" pitchFamily="49" charset="0"/>
-              </a:rPr>
-              <a:t>"</a:t>
-            </a:r>
-            <a:r>
-              <a:rPr lang="de-CH" sz="1100" b="1" dirty="0" err="1">
-                <a:solidFill>
-                  <a:srgbClr val="0451A5"/>
-                </a:solidFill>
-                <a:effectLst/>
-                <a:latin typeface="Consolas" panose="020B0609020204030204" pitchFamily="49" charset="0"/>
+                <a:latin typeface="Courier New" panose="02070309020205020404" pitchFamily="49" charset="0"/>
+                <a:cs typeface="Courier New" panose="02070309020205020404" pitchFamily="49" charset="0"/>
+              </a:rPr>
+              <a:t>{"</a:t>
+            </a:r>
+            <a:r>
+              <a:rPr lang="de-CH" sz="1000" b="1" dirty="0" err="1">
+                <a:solidFill>
+                  <a:srgbClr val="212121"/>
+                </a:solidFill>
+                <a:latin typeface="Courier New" panose="02070309020205020404" pitchFamily="49" charset="0"/>
+                <a:cs typeface="Courier New" panose="02070309020205020404" pitchFamily="49" charset="0"/>
               </a:rPr>
               <a:t>creationTime</a:t>
             </a:r>
             <a:r>
-              <a:rPr lang="de-CH" sz="1100" b="1" dirty="0">
-                <a:solidFill>
-                  <a:srgbClr val="0451A5"/>
-                </a:solidFill>
-                <a:effectLst/>
-                <a:latin typeface="Consolas" panose="020B0609020204030204" pitchFamily="49" charset="0"/>
-              </a:rPr>
-              <a:t>"</a:t>
-            </a:r>
-            <a:r>
-              <a:rPr lang="de-CH" sz="1100" b="1" dirty="0">
+              <a:rPr lang="de-CH" sz="1000" b="1" dirty="0">
                 <a:solidFill>
                   <a:srgbClr val="212121"/>
                 </a:solidFill>
-                <a:effectLst/>
-                <a:latin typeface="Consolas" panose="020B0609020204030204" pitchFamily="49" charset="0"/>
-              </a:rPr>
-              <a:t>: </a:t>
-            </a:r>
-            <a:r>
-              <a:rPr lang="de-CH" sz="1100" b="1" dirty="0">
-                <a:solidFill>
-                  <a:srgbClr val="A31515"/>
-                </a:solidFill>
-                <a:effectLst/>
-                <a:latin typeface="Consolas" panose="020B0609020204030204" pitchFamily="49" charset="0"/>
-              </a:rPr>
-              <a:t>"2021-11-25"</a:t>
-            </a:r>
-            <a:r>
-              <a:rPr lang="de-CH" sz="1100" b="1" dirty="0">
+                <a:latin typeface="Courier New" panose="02070309020205020404" pitchFamily="49" charset="0"/>
+                <a:cs typeface="Courier New" panose="02070309020205020404" pitchFamily="49" charset="0"/>
+              </a:rPr>
+              <a:t>": "2021-11-25"</a:t>
+            </a:r>
+          </a:p>
+          <a:p>
+            <a:r>
+              <a:rPr lang="de-CH" sz="1000" dirty="0">
                 <a:solidFill>
                   <a:srgbClr val="212121"/>
                 </a:solidFill>
-                <a:effectLst/>
-                <a:latin typeface="Consolas" panose="020B0609020204030204" pitchFamily="49" charset="0"/>
-              </a:rPr>
-              <a:t>,</a:t>
-            </a:r>
-          </a:p>
-          <a:p>
-            <a:r>
-              <a:rPr lang="de-CH" sz="1100" b="0" dirty="0">
+                <a:latin typeface="Courier New" panose="02070309020205020404" pitchFamily="49" charset="0"/>
+                <a:cs typeface="Courier New" panose="02070309020205020404" pitchFamily="49" charset="0"/>
+              </a:rPr>
+              <a:t>  ,"tags":</a:t>
+            </a:r>
+            <a:br>
+              <a:rPr lang="de-CH" sz="1000" dirty="0">
                 <a:solidFill>
                   <a:srgbClr val="212121"/>
                 </a:solidFill>
-                <a:effectLst/>
-                <a:latin typeface="Consolas" panose="020B0609020204030204" pitchFamily="49" charset="0"/>
-              </a:rPr>
-              <a:t> </a:t>
-            </a:r>
-            <a:r>
-              <a:rPr lang="de-CH" sz="1100" b="0" dirty="0">
-                <a:solidFill>
-                  <a:srgbClr val="0451A5"/>
-                </a:solidFill>
-                <a:effectLst/>
-                <a:latin typeface="Consolas" panose="020B0609020204030204" pitchFamily="49" charset="0"/>
-              </a:rPr>
-              <a:t>"tags"</a:t>
-            </a:r>
-            <a:r>
-              <a:rPr lang="de-CH" sz="1100" b="0" dirty="0">
+                <a:latin typeface="Courier New" panose="02070309020205020404" pitchFamily="49" charset="0"/>
+                <a:cs typeface="Courier New" panose="02070309020205020404" pitchFamily="49" charset="0"/>
+              </a:rPr>
+            </a:br>
+            <a:r>
+              <a:rPr lang="de-CH" sz="1000" dirty="0">
                 <a:solidFill>
                   <a:srgbClr val="212121"/>
                 </a:solidFill>
-                <a:effectLst/>
-                <a:latin typeface="Consolas" panose="020B0609020204030204" pitchFamily="49" charset="0"/>
-              </a:rPr>
-              <a:t>: </a:t>
-            </a:r>
-          </a:p>
-          <a:p>
-            <a:r>
-              <a:rPr lang="de-CH" sz="1100" dirty="0">
+                <a:latin typeface="Courier New" panose="02070309020205020404" pitchFamily="49" charset="0"/>
+                <a:cs typeface="Courier New" panose="02070309020205020404" pitchFamily="49" charset="0"/>
+              </a:rPr>
+              <a:t>    ["LoadedAt:2023-05-12T07:51:32.343"</a:t>
+            </a:r>
+          </a:p>
+          <a:p>
+            <a:r>
+              <a:rPr lang="de-CH" sz="1000" dirty="0">
                 <a:solidFill>
                   <a:srgbClr val="212121"/>
                 </a:solidFill>
-                <a:latin typeface="Consolas" panose="020B0609020204030204" pitchFamily="49" charset="0"/>
-              </a:rPr>
-              <a:t>   </a:t>
-            </a:r>
-            <a:r>
-              <a:rPr lang="de-CH" sz="1100" b="0" dirty="0">
+                <a:latin typeface="Courier New" panose="02070309020205020404" pitchFamily="49" charset="0"/>
+                <a:cs typeface="Courier New" panose="02070309020205020404" pitchFamily="49" charset="0"/>
+              </a:rPr>
+              <a:t>    ,"SlicedImportObject_Id:4FC9A0…A23E7F7"</a:t>
+            </a:r>
+          </a:p>
+          <a:p>
+            <a:r>
+              <a:rPr lang="de-CH" sz="1000" dirty="0">
                 <a:solidFill>
                   <a:srgbClr val="212121"/>
                 </a:solidFill>
-                <a:effectLst/>
-                <a:latin typeface="Consolas" panose="020B0609020204030204" pitchFamily="49" charset="0"/>
-              </a:rPr>
-              <a:t>[</a:t>
-            </a:r>
-            <a:r>
-              <a:rPr lang="de-CH" sz="1100" b="0" dirty="0">
-                <a:solidFill>
-                  <a:srgbClr val="A31515"/>
-                </a:solidFill>
-                <a:effectLst/>
-                <a:latin typeface="Consolas" panose="020B0609020204030204" pitchFamily="49" charset="0"/>
-              </a:rPr>
-              <a:t>"</a:t>
-            </a:r>
-            <a:r>
-              <a:rPr lang="de-CH" sz="1100" b="0" dirty="0" err="1">
-                <a:solidFill>
-                  <a:srgbClr val="A31515"/>
-                </a:solidFill>
-                <a:effectLst/>
-                <a:latin typeface="Consolas" panose="020B0609020204030204" pitchFamily="49" charset="0"/>
-              </a:rPr>
-              <a:t>Source:PipelineLoad</a:t>
-            </a:r>
-            <a:r>
-              <a:rPr lang="de-CH" sz="1100" b="0" dirty="0">
-                <a:solidFill>
-                  <a:srgbClr val="A31515"/>
-                </a:solidFill>
-                <a:effectLst/>
-                <a:latin typeface="Consolas" panose="020B0609020204030204" pitchFamily="49" charset="0"/>
-              </a:rPr>
-              <a:t>"</a:t>
-            </a:r>
-            <a:r>
-              <a:rPr lang="de-CH" sz="1100" b="0" dirty="0">
+                <a:latin typeface="Courier New" panose="02070309020205020404" pitchFamily="49" charset="0"/>
+                <a:cs typeface="Courier New" panose="02070309020205020404" pitchFamily="49" charset="0"/>
+              </a:rPr>
+              <a:t>    ,"PipelineRun_Id:04d26153-99…710ca6d2"</a:t>
+            </a:r>
+          </a:p>
+          <a:p>
+            <a:r>
+              <a:rPr lang="de-CH" sz="1000" dirty="0">
                 <a:solidFill>
                   <a:srgbClr val="212121"/>
                 </a:solidFill>
-                <a:effectLst/>
-                <a:latin typeface="Consolas" panose="020B0609020204030204" pitchFamily="49" charset="0"/>
-              </a:rPr>
-              <a:t>,</a:t>
-            </a:r>
-          </a:p>
-          <a:p>
-            <a:r>
-              <a:rPr lang="de-CH" sz="1100" b="0" dirty="0">
+                <a:latin typeface="Courier New" panose="02070309020205020404" pitchFamily="49" charset="0"/>
+                <a:cs typeface="Courier New" panose="02070309020205020404" pitchFamily="49" charset="0"/>
+              </a:rPr>
+              <a:t>    </a:t>
+            </a:r>
+            <a:r>
+              <a:rPr lang="de-CH" sz="1000" b="1" dirty="0">
                 <a:solidFill>
                   <a:srgbClr val="212121"/>
                 </a:solidFill>
-                <a:effectLst/>
-                <a:latin typeface="Consolas" panose="020B0609020204030204" pitchFamily="49" charset="0"/>
-              </a:rPr>
-              <a:t>    </a:t>
-            </a:r>
-            <a:r>
-              <a:rPr lang="de-CH" sz="1100" b="0" dirty="0">
-                <a:solidFill>
-                  <a:srgbClr val="A31515"/>
-                </a:solidFill>
-                <a:effectLst/>
-                <a:latin typeface="Consolas" panose="020B0609020204030204" pitchFamily="49" charset="0"/>
-              </a:rPr>
-              <a:t>"LoadedAt:2023-05-04T05:24:10.583"</a:t>
-            </a:r>
-            <a:r>
-              <a:rPr lang="de-CH" sz="1100" b="0" dirty="0">
+                <a:latin typeface="Courier New" panose="02070309020205020404" pitchFamily="49" charset="0"/>
+                <a:cs typeface="Courier New" panose="02070309020205020404" pitchFamily="49" charset="0"/>
+              </a:rPr>
+              <a:t>,"ExtentFingerprint:20211125"</a:t>
+            </a:r>
+            <a:r>
+              <a:rPr lang="de-CH" sz="1000" dirty="0">
                 <a:solidFill>
                   <a:srgbClr val="212121"/>
                 </a:solidFill>
-                <a:effectLst/>
-                <a:latin typeface="Consolas" panose="020B0609020204030204" pitchFamily="49" charset="0"/>
-              </a:rPr>
-              <a:t>,</a:t>
-            </a:r>
-          </a:p>
-          <a:p>
-            <a:r>
-              <a:rPr lang="de-CH" sz="1100" b="0" dirty="0">
-                <a:solidFill>
-                  <a:srgbClr val="212121"/>
-                </a:solidFill>
-                <a:effectLst/>
-                <a:latin typeface="Consolas" panose="020B0609020204030204" pitchFamily="49" charset="0"/>
-              </a:rPr>
-              <a:t>    </a:t>
-            </a:r>
-            <a:r>
-              <a:rPr lang="de-CH" sz="1100" b="0" dirty="0">
-                <a:solidFill>
-                  <a:srgbClr val="A31515"/>
-                </a:solidFill>
-                <a:effectLst/>
-                <a:latin typeface="Consolas" panose="020B0609020204030204" pitchFamily="49" charset="0"/>
-              </a:rPr>
-              <a:t>"SlicedImportObject_Id:6DD4A13A-…-BF79"</a:t>
-            </a:r>
-            <a:r>
-              <a:rPr lang="de-CH" sz="1100" b="0" dirty="0">
-                <a:solidFill>
-                  <a:srgbClr val="212121"/>
-                </a:solidFill>
-                <a:effectLst/>
-                <a:latin typeface="Consolas" panose="020B0609020204030204" pitchFamily="49" charset="0"/>
-              </a:rPr>
-              <a:t>]</a:t>
-            </a:r>
-          </a:p>
-          <a:p>
-            <a:r>
-              <a:rPr lang="de-CH" sz="1100" b="0" dirty="0">
-                <a:solidFill>
-                  <a:srgbClr val="212121"/>
-                </a:solidFill>
-                <a:effectLst/>
-                <a:latin typeface="Consolas" panose="020B0609020204030204" pitchFamily="49" charset="0"/>
-              </a:rPr>
-              <a:t>}</a:t>
+                <a:latin typeface="Courier New" panose="02070309020205020404" pitchFamily="49" charset="0"/>
+                <a:cs typeface="Courier New" panose="02070309020205020404" pitchFamily="49" charset="0"/>
+              </a:rPr>
+              <a:t>]}</a:t>
             </a:r>
           </a:p>
         </p:txBody>
@@ -38172,244 +37906,127 @@
           <a:bodyPr rtlCol="0" anchor="ctr"/>
           <a:lstStyle/>
           <a:p>
-            <a:r>
-              <a:rPr lang="de-CH" sz="1100" b="0" dirty="0">
+            <a:pPr lvl="0"/>
+            <a:r>
+              <a:rPr lang="de-CH" sz="1000" dirty="0">
                 <a:solidFill>
                   <a:srgbClr val="212121"/>
                 </a:solidFill>
-                <a:effectLst/>
-                <a:latin typeface="Consolas" panose="020B0609020204030204" pitchFamily="49" charset="0"/>
-              </a:rPr>
-              <a:t>{</a:t>
-            </a:r>
-            <a:r>
-              <a:rPr lang="de-CH" sz="1100" b="1" dirty="0">
-                <a:solidFill>
-                  <a:srgbClr val="0451A5"/>
-                </a:solidFill>
-                <a:effectLst/>
-                <a:latin typeface="Consolas" panose="020B0609020204030204" pitchFamily="49" charset="0"/>
-              </a:rPr>
-              <a:t>"</a:t>
-            </a:r>
-            <a:r>
-              <a:rPr lang="de-CH" sz="1100" b="1" dirty="0" err="1">
-                <a:solidFill>
-                  <a:srgbClr val="0451A5"/>
-                </a:solidFill>
-                <a:effectLst/>
-                <a:latin typeface="Consolas" panose="020B0609020204030204" pitchFamily="49" charset="0"/>
+                <a:latin typeface="Courier New" panose="02070309020205020404" pitchFamily="49" charset="0"/>
+                <a:cs typeface="Courier New" panose="02070309020205020404" pitchFamily="49" charset="0"/>
+              </a:rPr>
+              <a:t>{"</a:t>
+            </a:r>
+            <a:r>
+              <a:rPr lang="de-CH" sz="1000" b="1" dirty="0" err="1">
+                <a:solidFill>
+                  <a:srgbClr val="212121"/>
+                </a:solidFill>
+                <a:latin typeface="Courier New" panose="02070309020205020404" pitchFamily="49" charset="0"/>
+                <a:cs typeface="Courier New" panose="02070309020205020404" pitchFamily="49" charset="0"/>
               </a:rPr>
               <a:t>creationTime</a:t>
             </a:r>
             <a:r>
-              <a:rPr lang="de-CH" sz="1100" b="1" dirty="0">
-                <a:solidFill>
-                  <a:srgbClr val="0451A5"/>
-                </a:solidFill>
-                <a:effectLst/>
-                <a:latin typeface="Consolas" panose="020B0609020204030204" pitchFamily="49" charset="0"/>
-              </a:rPr>
-              <a:t>"</a:t>
-            </a:r>
-            <a:r>
-              <a:rPr lang="de-CH" sz="1100" b="1" dirty="0">
+              <a:rPr lang="de-CH" sz="1000" b="1" dirty="0">
                 <a:solidFill>
                   <a:srgbClr val="212121"/>
                 </a:solidFill>
-                <a:effectLst/>
-                <a:latin typeface="Consolas" panose="020B0609020204030204" pitchFamily="49" charset="0"/>
-              </a:rPr>
-              <a:t>: </a:t>
-            </a:r>
-            <a:r>
-              <a:rPr lang="de-CH" sz="1100" b="1" dirty="0">
-                <a:solidFill>
-                  <a:srgbClr val="A31515"/>
-                </a:solidFill>
-                <a:effectLst/>
-                <a:latin typeface="Consolas" panose="020B0609020204030204" pitchFamily="49" charset="0"/>
-              </a:rPr>
-              <a:t>"2021-11-26"</a:t>
-            </a:r>
-            <a:r>
-              <a:rPr lang="de-CH" sz="1100" b="0" dirty="0">
+                <a:latin typeface="Courier New" panose="02070309020205020404" pitchFamily="49" charset="0"/>
+                <a:cs typeface="Courier New" panose="02070309020205020404" pitchFamily="49" charset="0"/>
+              </a:rPr>
+              <a:t>": "2021-11-26"</a:t>
+            </a:r>
+          </a:p>
+          <a:p>
+            <a:pPr lvl="0"/>
+            <a:r>
+              <a:rPr lang="de-CH" sz="1000" dirty="0">
                 <a:solidFill>
                   <a:srgbClr val="212121"/>
                 </a:solidFill>
-                <a:effectLst/>
-                <a:latin typeface="Consolas" panose="020B0609020204030204" pitchFamily="49" charset="0"/>
-              </a:rPr>
-              <a:t>,</a:t>
-            </a:r>
-          </a:p>
-          <a:p>
-            <a:r>
-              <a:rPr lang="de-CH" sz="1100" b="0" dirty="0">
+                <a:latin typeface="Courier New" panose="02070309020205020404" pitchFamily="49" charset="0"/>
+                <a:cs typeface="Courier New" panose="02070309020205020404" pitchFamily="49" charset="0"/>
+              </a:rPr>
+              <a:t>  ,"tags":</a:t>
+            </a:r>
+            <a:br>
+              <a:rPr lang="de-CH" sz="1000" dirty="0">
                 <a:solidFill>
                   <a:srgbClr val="212121"/>
                 </a:solidFill>
-                <a:effectLst/>
-                <a:latin typeface="Consolas" panose="020B0609020204030204" pitchFamily="49" charset="0"/>
-              </a:rPr>
-              <a:t> </a:t>
-            </a:r>
-            <a:r>
-              <a:rPr lang="de-CH" sz="1100" b="0" dirty="0">
-                <a:solidFill>
-                  <a:srgbClr val="0451A5"/>
-                </a:solidFill>
-                <a:effectLst/>
-                <a:latin typeface="Consolas" panose="020B0609020204030204" pitchFamily="49" charset="0"/>
-              </a:rPr>
-              <a:t>"tags"</a:t>
-            </a:r>
-            <a:r>
-              <a:rPr lang="de-CH" sz="1100" b="0" dirty="0">
+                <a:latin typeface="Courier New" panose="02070309020205020404" pitchFamily="49" charset="0"/>
+                <a:cs typeface="Courier New" panose="02070309020205020404" pitchFamily="49" charset="0"/>
+              </a:rPr>
+            </a:br>
+            <a:r>
+              <a:rPr lang="de-CH" sz="1000" dirty="0">
                 <a:solidFill>
                   <a:srgbClr val="212121"/>
                 </a:solidFill>
-                <a:effectLst/>
-                <a:latin typeface="Consolas" panose="020B0609020204030204" pitchFamily="49" charset="0"/>
-              </a:rPr>
-              <a:t>: </a:t>
-            </a:r>
-          </a:p>
-          <a:p>
-            <a:r>
-              <a:rPr lang="de-CH" sz="1100" dirty="0">
+                <a:latin typeface="Courier New" panose="02070309020205020404" pitchFamily="49" charset="0"/>
+                <a:cs typeface="Courier New" panose="02070309020205020404" pitchFamily="49" charset="0"/>
+              </a:rPr>
+              <a:t>    ["LoadedAt:2023-05-12T07:51:32.343"</a:t>
+            </a:r>
+          </a:p>
+          <a:p>
+            <a:pPr lvl="0"/>
+            <a:r>
+              <a:rPr lang="de-CH" sz="1000" dirty="0">
                 <a:solidFill>
                   <a:srgbClr val="212121"/>
                 </a:solidFill>
-                <a:latin typeface="Consolas" panose="020B0609020204030204" pitchFamily="49" charset="0"/>
-              </a:rPr>
-              <a:t>   </a:t>
-            </a:r>
-            <a:r>
-              <a:rPr lang="de-CH" sz="1100" b="0" dirty="0">
+                <a:latin typeface="Courier New" panose="02070309020205020404" pitchFamily="49" charset="0"/>
+                <a:cs typeface="Courier New" panose="02070309020205020404" pitchFamily="49" charset="0"/>
+              </a:rPr>
+              <a:t>    ,"SlicedImportObject_Id:5FC9A0…A23E7F7"</a:t>
+            </a:r>
+          </a:p>
+          <a:p>
+            <a:pPr lvl="0"/>
+            <a:r>
+              <a:rPr lang="de-CH" sz="1000" dirty="0">
                 <a:solidFill>
                   <a:srgbClr val="212121"/>
                 </a:solidFill>
-                <a:effectLst/>
-                <a:latin typeface="Consolas" panose="020B0609020204030204" pitchFamily="49" charset="0"/>
-              </a:rPr>
-              <a:t>[</a:t>
-            </a:r>
-            <a:r>
-              <a:rPr lang="de-CH" sz="1100" b="0" dirty="0">
-                <a:solidFill>
-                  <a:srgbClr val="A31515"/>
-                </a:solidFill>
-                <a:effectLst/>
-                <a:latin typeface="Consolas" panose="020B0609020204030204" pitchFamily="49" charset="0"/>
-              </a:rPr>
-              <a:t>"</a:t>
-            </a:r>
-            <a:r>
-              <a:rPr lang="de-CH" sz="1100" b="0" dirty="0" err="1">
-                <a:solidFill>
-                  <a:srgbClr val="A31515"/>
-                </a:solidFill>
-                <a:effectLst/>
-                <a:latin typeface="Consolas" panose="020B0609020204030204" pitchFamily="49" charset="0"/>
-              </a:rPr>
-              <a:t>Source:PipelineLoad</a:t>
-            </a:r>
-            <a:r>
-              <a:rPr lang="de-CH" sz="1100" b="0" dirty="0">
-                <a:solidFill>
-                  <a:srgbClr val="A31515"/>
-                </a:solidFill>
-                <a:effectLst/>
-                <a:latin typeface="Consolas" panose="020B0609020204030204" pitchFamily="49" charset="0"/>
-              </a:rPr>
-              <a:t>"</a:t>
-            </a:r>
-            <a:r>
-              <a:rPr lang="de-CH" sz="1100" b="0" dirty="0">
+                <a:latin typeface="Courier New" panose="02070309020205020404" pitchFamily="49" charset="0"/>
+                <a:cs typeface="Courier New" panose="02070309020205020404" pitchFamily="49" charset="0"/>
+              </a:rPr>
+              <a:t>    ,"PipelineRun_Id:14d26153-99…710ca6d2"</a:t>
+            </a:r>
+          </a:p>
+          <a:p>
+            <a:pPr lvl="0"/>
+            <a:r>
+              <a:rPr lang="de-CH" sz="1000" dirty="0">
                 <a:solidFill>
                   <a:srgbClr val="212121"/>
                 </a:solidFill>
-                <a:effectLst/>
-                <a:latin typeface="Consolas" panose="020B0609020204030204" pitchFamily="49" charset="0"/>
-              </a:rPr>
-              <a:t>,</a:t>
-            </a:r>
-          </a:p>
-          <a:p>
-            <a:r>
-              <a:rPr lang="de-CH" sz="1100" b="0" dirty="0">
+                <a:latin typeface="Courier New" panose="02070309020205020404" pitchFamily="49" charset="0"/>
+                <a:cs typeface="Courier New" panose="02070309020205020404" pitchFamily="49" charset="0"/>
+              </a:rPr>
+              <a:t>    </a:t>
+            </a:r>
+            <a:r>
+              <a:rPr lang="de-CH" sz="1000" b="1" dirty="0">
                 <a:solidFill>
                   <a:srgbClr val="212121"/>
                 </a:solidFill>
-                <a:effectLst/>
-                <a:latin typeface="Consolas" panose="020B0609020204030204" pitchFamily="49" charset="0"/>
-              </a:rPr>
-              <a:t>    </a:t>
-            </a:r>
-            <a:r>
-              <a:rPr lang="de-CH" sz="1100" b="0" dirty="0">
-                <a:solidFill>
-                  <a:srgbClr val="A31515"/>
-                </a:solidFill>
-                <a:effectLst/>
-                <a:latin typeface="Consolas" panose="020B0609020204030204" pitchFamily="49" charset="0"/>
-              </a:rPr>
-              <a:t>"LoadedAt:2023-05-04T05:24:10.583"</a:t>
-            </a:r>
-            <a:r>
-              <a:rPr lang="de-CH" sz="1100" b="0" dirty="0">
+                <a:latin typeface="Courier New" panose="02070309020205020404" pitchFamily="49" charset="0"/>
+                <a:cs typeface="Courier New" panose="02070309020205020404" pitchFamily="49" charset="0"/>
+              </a:rPr>
+              <a:t>,"ExtentFingerprint:20211126"</a:t>
+            </a:r>
+            <a:r>
+              <a:rPr lang="de-CH" sz="1000" dirty="0">
                 <a:solidFill>
                   <a:srgbClr val="212121"/>
                 </a:solidFill>
-                <a:effectLst/>
-                <a:latin typeface="Consolas" panose="020B0609020204030204" pitchFamily="49" charset="0"/>
-              </a:rPr>
-              <a:t>,</a:t>
-            </a:r>
-          </a:p>
-          <a:p>
-            <a:r>
-              <a:rPr lang="de-CH" sz="1100" b="0" dirty="0">
-                <a:solidFill>
-                  <a:srgbClr val="212121"/>
-                </a:solidFill>
-                <a:effectLst/>
-                <a:latin typeface="Consolas" panose="020B0609020204030204" pitchFamily="49" charset="0"/>
-              </a:rPr>
-              <a:t>    </a:t>
-            </a:r>
-            <a:r>
-              <a:rPr lang="de-CH" sz="1100" b="0" dirty="0">
-                <a:solidFill>
-                  <a:srgbClr val="A31515"/>
-                </a:solidFill>
-                <a:effectLst/>
-                <a:latin typeface="Consolas" panose="020B0609020204030204" pitchFamily="49" charset="0"/>
-              </a:rPr>
-              <a:t>"SlicedImportObject_Id:6BD4A13A-…-BF79"</a:t>
-            </a:r>
-            <a:r>
-              <a:rPr lang="de-CH" sz="1100" b="0" dirty="0">
-                <a:solidFill>
-                  <a:srgbClr val="212121"/>
-                </a:solidFill>
-                <a:effectLst/>
-                <a:latin typeface="Consolas" panose="020B0609020204030204" pitchFamily="49" charset="0"/>
-              </a:rPr>
-              <a:t>]</a:t>
-            </a:r>
-          </a:p>
-          <a:p>
-            <a:r>
-              <a:rPr lang="de-CH" sz="1100" b="0" dirty="0">
-                <a:solidFill>
-                  <a:srgbClr val="212121"/>
-                </a:solidFill>
-                <a:effectLst/>
-                <a:latin typeface="Consolas" panose="020B0609020204030204" pitchFamily="49" charset="0"/>
-              </a:rPr>
-              <a:t>}</a:t>
+                <a:latin typeface="Courier New" panose="02070309020205020404" pitchFamily="49" charset="0"/>
+                <a:cs typeface="Courier New" panose="02070309020205020404" pitchFamily="49" charset="0"/>
+              </a:rPr>
+              <a:t>]}</a:t>
             </a:r>
           </a:p>
         </p:txBody>
@@ -38476,244 +38093,127 @@
           <a:bodyPr rtlCol="0" anchor="ctr"/>
           <a:lstStyle/>
           <a:p>
-            <a:r>
-              <a:rPr lang="de-CH" sz="1100" dirty="0">
+            <a:pPr lvl="0"/>
+            <a:r>
+              <a:rPr lang="de-CH" sz="1000" dirty="0">
                 <a:solidFill>
                   <a:srgbClr val="212121"/>
                 </a:solidFill>
-                <a:effectLst/>
-                <a:latin typeface="Consolas" panose="020B0609020204030204" pitchFamily="49" charset="0"/>
-              </a:rPr>
-              <a:t>{</a:t>
-            </a:r>
-            <a:r>
-              <a:rPr lang="de-CH" sz="1100" b="1" dirty="0">
-                <a:solidFill>
-                  <a:srgbClr val="0451A5"/>
-                </a:solidFill>
-                <a:effectLst/>
-                <a:latin typeface="Consolas" panose="020B0609020204030204" pitchFamily="49" charset="0"/>
-              </a:rPr>
-              <a:t>"</a:t>
-            </a:r>
-            <a:r>
-              <a:rPr lang="de-CH" sz="1100" b="1" dirty="0" err="1">
-                <a:solidFill>
-                  <a:srgbClr val="0451A5"/>
-                </a:solidFill>
-                <a:effectLst/>
-                <a:latin typeface="Consolas" panose="020B0609020204030204" pitchFamily="49" charset="0"/>
+                <a:latin typeface="Courier New" panose="02070309020205020404" pitchFamily="49" charset="0"/>
+                <a:cs typeface="Courier New" panose="02070309020205020404" pitchFamily="49" charset="0"/>
+              </a:rPr>
+              <a:t>{"</a:t>
+            </a:r>
+            <a:r>
+              <a:rPr lang="de-CH" sz="1000" b="1" dirty="0" err="1">
+                <a:solidFill>
+                  <a:srgbClr val="212121"/>
+                </a:solidFill>
+                <a:latin typeface="Courier New" panose="02070309020205020404" pitchFamily="49" charset="0"/>
+                <a:cs typeface="Courier New" panose="02070309020205020404" pitchFamily="49" charset="0"/>
               </a:rPr>
               <a:t>creationTime</a:t>
             </a:r>
             <a:r>
-              <a:rPr lang="de-CH" sz="1100" b="1" dirty="0">
-                <a:solidFill>
-                  <a:srgbClr val="0451A5"/>
-                </a:solidFill>
-                <a:effectLst/>
-                <a:latin typeface="Consolas" panose="020B0609020204030204" pitchFamily="49" charset="0"/>
-              </a:rPr>
-              <a:t>"</a:t>
-            </a:r>
-            <a:r>
-              <a:rPr lang="de-CH" sz="1100" b="1" dirty="0">
+              <a:rPr lang="de-CH" sz="1000" b="1" dirty="0">
                 <a:solidFill>
                   <a:srgbClr val="212121"/>
                 </a:solidFill>
-                <a:effectLst/>
-                <a:latin typeface="Consolas" panose="020B0609020204030204" pitchFamily="49" charset="0"/>
-              </a:rPr>
-              <a:t>: </a:t>
-            </a:r>
-            <a:r>
-              <a:rPr lang="de-CH" sz="1100" b="1" dirty="0">
-                <a:solidFill>
-                  <a:srgbClr val="A31515"/>
-                </a:solidFill>
-                <a:effectLst/>
-                <a:latin typeface="Consolas" panose="020B0609020204030204" pitchFamily="49" charset="0"/>
-              </a:rPr>
-              <a:t>"2021-11-27"</a:t>
-            </a:r>
-            <a:r>
-              <a:rPr lang="de-CH" sz="1100" b="1" dirty="0">
+                <a:latin typeface="Courier New" panose="02070309020205020404" pitchFamily="49" charset="0"/>
+                <a:cs typeface="Courier New" panose="02070309020205020404" pitchFamily="49" charset="0"/>
+              </a:rPr>
+              <a:t>": "2021-11-27"</a:t>
+            </a:r>
+          </a:p>
+          <a:p>
+            <a:pPr lvl="0"/>
+            <a:r>
+              <a:rPr lang="de-CH" sz="1000" dirty="0">
                 <a:solidFill>
                   <a:srgbClr val="212121"/>
                 </a:solidFill>
-                <a:effectLst/>
-                <a:latin typeface="Consolas" panose="020B0609020204030204" pitchFamily="49" charset="0"/>
-              </a:rPr>
-              <a:t>,</a:t>
-            </a:r>
-          </a:p>
-          <a:p>
-            <a:r>
-              <a:rPr lang="de-CH" sz="1100" b="0" dirty="0">
+                <a:latin typeface="Courier New" panose="02070309020205020404" pitchFamily="49" charset="0"/>
+                <a:cs typeface="Courier New" panose="02070309020205020404" pitchFamily="49" charset="0"/>
+              </a:rPr>
+              <a:t>  ,"tags":</a:t>
+            </a:r>
+            <a:br>
+              <a:rPr lang="de-CH" sz="1000" dirty="0">
                 <a:solidFill>
                   <a:srgbClr val="212121"/>
                 </a:solidFill>
-                <a:effectLst/>
-                <a:latin typeface="Consolas" panose="020B0609020204030204" pitchFamily="49" charset="0"/>
-              </a:rPr>
-              <a:t> </a:t>
-            </a:r>
-            <a:r>
-              <a:rPr lang="de-CH" sz="1100" b="0" dirty="0">
-                <a:solidFill>
-                  <a:srgbClr val="0451A5"/>
-                </a:solidFill>
-                <a:effectLst/>
-                <a:latin typeface="Consolas" panose="020B0609020204030204" pitchFamily="49" charset="0"/>
-              </a:rPr>
-              <a:t>"tags"</a:t>
-            </a:r>
-            <a:r>
-              <a:rPr lang="de-CH" sz="1100" b="0" dirty="0">
+                <a:latin typeface="Courier New" panose="02070309020205020404" pitchFamily="49" charset="0"/>
+                <a:cs typeface="Courier New" panose="02070309020205020404" pitchFamily="49" charset="0"/>
+              </a:rPr>
+            </a:br>
+            <a:r>
+              <a:rPr lang="de-CH" sz="1000" dirty="0">
                 <a:solidFill>
                   <a:srgbClr val="212121"/>
                 </a:solidFill>
-                <a:effectLst/>
-                <a:latin typeface="Consolas" panose="020B0609020204030204" pitchFamily="49" charset="0"/>
-              </a:rPr>
-              <a:t>: </a:t>
-            </a:r>
-          </a:p>
-          <a:p>
-            <a:r>
-              <a:rPr lang="de-CH" sz="1100" dirty="0">
+                <a:latin typeface="Courier New" panose="02070309020205020404" pitchFamily="49" charset="0"/>
+                <a:cs typeface="Courier New" panose="02070309020205020404" pitchFamily="49" charset="0"/>
+              </a:rPr>
+              <a:t>    ["LoadedAt:2023-05-12T07:51:32.343"</a:t>
+            </a:r>
+          </a:p>
+          <a:p>
+            <a:pPr lvl="0"/>
+            <a:r>
+              <a:rPr lang="de-CH" sz="1000" dirty="0">
                 <a:solidFill>
                   <a:srgbClr val="212121"/>
                 </a:solidFill>
-                <a:latin typeface="Consolas" panose="020B0609020204030204" pitchFamily="49" charset="0"/>
-              </a:rPr>
-              <a:t>   </a:t>
-            </a:r>
-            <a:r>
-              <a:rPr lang="de-CH" sz="1100" b="0" dirty="0">
+                <a:latin typeface="Courier New" panose="02070309020205020404" pitchFamily="49" charset="0"/>
+                <a:cs typeface="Courier New" panose="02070309020205020404" pitchFamily="49" charset="0"/>
+              </a:rPr>
+              <a:t>    ,"SlicedImportObject_Id:6FC9A0…A23E7F7"</a:t>
+            </a:r>
+          </a:p>
+          <a:p>
+            <a:pPr lvl="0"/>
+            <a:r>
+              <a:rPr lang="de-CH" sz="1000" dirty="0">
                 <a:solidFill>
                   <a:srgbClr val="212121"/>
                 </a:solidFill>
-                <a:effectLst/>
-                <a:latin typeface="Consolas" panose="020B0609020204030204" pitchFamily="49" charset="0"/>
-              </a:rPr>
-              <a:t>[</a:t>
-            </a:r>
-            <a:r>
-              <a:rPr lang="de-CH" sz="1100" b="0" dirty="0">
-                <a:solidFill>
-                  <a:srgbClr val="A31515"/>
-                </a:solidFill>
-                <a:effectLst/>
-                <a:latin typeface="Consolas" panose="020B0609020204030204" pitchFamily="49" charset="0"/>
-              </a:rPr>
-              <a:t>"</a:t>
-            </a:r>
-            <a:r>
-              <a:rPr lang="de-CH" sz="1100" b="0" dirty="0" err="1">
-                <a:solidFill>
-                  <a:srgbClr val="A31515"/>
-                </a:solidFill>
-                <a:effectLst/>
-                <a:latin typeface="Consolas" panose="020B0609020204030204" pitchFamily="49" charset="0"/>
-              </a:rPr>
-              <a:t>Source:PipelineLoad</a:t>
-            </a:r>
-            <a:r>
-              <a:rPr lang="de-CH" sz="1100" b="0" dirty="0">
-                <a:solidFill>
-                  <a:srgbClr val="A31515"/>
-                </a:solidFill>
-                <a:effectLst/>
-                <a:latin typeface="Consolas" panose="020B0609020204030204" pitchFamily="49" charset="0"/>
-              </a:rPr>
-              <a:t>"</a:t>
-            </a:r>
-            <a:r>
-              <a:rPr lang="de-CH" sz="1100" b="0" dirty="0">
+                <a:latin typeface="Courier New" panose="02070309020205020404" pitchFamily="49" charset="0"/>
+                <a:cs typeface="Courier New" panose="02070309020205020404" pitchFamily="49" charset="0"/>
+              </a:rPr>
+              <a:t>    ,"PipelineRun_Id:34d26153-99…710ca6d2"</a:t>
+            </a:r>
+          </a:p>
+          <a:p>
+            <a:pPr lvl="0"/>
+            <a:r>
+              <a:rPr lang="de-CH" sz="1000" dirty="0">
                 <a:solidFill>
                   <a:srgbClr val="212121"/>
                 </a:solidFill>
-                <a:effectLst/>
-                <a:latin typeface="Consolas" panose="020B0609020204030204" pitchFamily="49" charset="0"/>
-              </a:rPr>
-              <a:t>,</a:t>
-            </a:r>
-          </a:p>
-          <a:p>
-            <a:r>
-              <a:rPr lang="de-CH" sz="1100" b="0" dirty="0">
+                <a:latin typeface="Courier New" panose="02070309020205020404" pitchFamily="49" charset="0"/>
+                <a:cs typeface="Courier New" panose="02070309020205020404" pitchFamily="49" charset="0"/>
+              </a:rPr>
+              <a:t>    </a:t>
+            </a:r>
+            <a:r>
+              <a:rPr lang="de-CH" sz="1000" b="1" dirty="0">
                 <a:solidFill>
                   <a:srgbClr val="212121"/>
                 </a:solidFill>
-                <a:effectLst/>
-                <a:latin typeface="Consolas" panose="020B0609020204030204" pitchFamily="49" charset="0"/>
-              </a:rPr>
-              <a:t>    </a:t>
-            </a:r>
-            <a:r>
-              <a:rPr lang="de-CH" sz="1100" b="0" dirty="0">
-                <a:solidFill>
-                  <a:srgbClr val="A31515"/>
-                </a:solidFill>
-                <a:effectLst/>
-                <a:latin typeface="Consolas" panose="020B0609020204030204" pitchFamily="49" charset="0"/>
-              </a:rPr>
-              <a:t>"LoadedAt:2023-05-04T05:24:10.583"</a:t>
-            </a:r>
-            <a:r>
-              <a:rPr lang="de-CH" sz="1100" b="0" dirty="0">
+                <a:latin typeface="Courier New" panose="02070309020205020404" pitchFamily="49" charset="0"/>
+                <a:cs typeface="Courier New" panose="02070309020205020404" pitchFamily="49" charset="0"/>
+              </a:rPr>
+              <a:t>,"ExtentFingerprint:20211127"</a:t>
+            </a:r>
+            <a:r>
+              <a:rPr lang="de-CH" sz="1000" dirty="0">
                 <a:solidFill>
                   <a:srgbClr val="212121"/>
                 </a:solidFill>
-                <a:effectLst/>
-                <a:latin typeface="Consolas" panose="020B0609020204030204" pitchFamily="49" charset="0"/>
-              </a:rPr>
-              <a:t>,</a:t>
-            </a:r>
-          </a:p>
-          <a:p>
-            <a:r>
-              <a:rPr lang="de-CH" sz="1100" b="0" dirty="0">
-                <a:solidFill>
-                  <a:srgbClr val="212121"/>
-                </a:solidFill>
-                <a:effectLst/>
-                <a:latin typeface="Consolas" panose="020B0609020204030204" pitchFamily="49" charset="0"/>
-              </a:rPr>
-              <a:t>    </a:t>
-            </a:r>
-            <a:r>
-              <a:rPr lang="de-CH" sz="1100" b="0" dirty="0">
-                <a:solidFill>
-                  <a:srgbClr val="A31515"/>
-                </a:solidFill>
-                <a:effectLst/>
-                <a:latin typeface="Consolas" panose="020B0609020204030204" pitchFamily="49" charset="0"/>
-              </a:rPr>
-              <a:t>"SlicedImportObject_Id:6AD4A13A-…-BF79"</a:t>
-            </a:r>
-            <a:r>
-              <a:rPr lang="de-CH" sz="1100" b="0" dirty="0">
-                <a:solidFill>
-                  <a:srgbClr val="212121"/>
-                </a:solidFill>
-                <a:effectLst/>
-                <a:latin typeface="Consolas" panose="020B0609020204030204" pitchFamily="49" charset="0"/>
-              </a:rPr>
-              <a:t>]</a:t>
-            </a:r>
-          </a:p>
-          <a:p>
-            <a:r>
-              <a:rPr lang="de-CH" sz="1100" b="0" dirty="0">
-                <a:solidFill>
-                  <a:srgbClr val="212121"/>
-                </a:solidFill>
-                <a:effectLst/>
-                <a:latin typeface="Consolas" panose="020B0609020204030204" pitchFamily="49" charset="0"/>
-              </a:rPr>
-              <a:t>}</a:t>
+                <a:latin typeface="Courier New" panose="02070309020205020404" pitchFamily="49" charset="0"/>
+                <a:cs typeface="Courier New" panose="02070309020205020404" pitchFamily="49" charset="0"/>
+              </a:rPr>
+              <a:t>]}</a:t>
             </a:r>
           </a:p>
         </p:txBody>

</xml_diff>